<commit_message>
Add new versions of headers
</commit_message>
<xml_diff>
--- a/Images/Header/Header.pptx
+++ b/Images/Header/Header.pptx
@@ -2,12 +2,12 @@
 <file path=ppt/presentation.xml><?xml version="1.0" encoding="utf-8"?>
 <p:presentation xmlns:a="http://schemas.openxmlformats.org/drawingml/2006/main" xmlns:r="http://schemas.openxmlformats.org/officeDocument/2006/relationships" xmlns:p="http://schemas.openxmlformats.org/presentationml/2006/main" saveSubsetFonts="1">
   <p:sldMasterIdLst>
-    <p:sldMasterId id="2147483684" r:id="rId1"/>
+    <p:sldMasterId id="2147483696" r:id="rId1"/>
   </p:sldMasterIdLst>
   <p:sldIdLst>
     <p:sldId id="256" r:id="rId2"/>
   </p:sldIdLst>
-  <p:sldSz cx="12192000" cy="2520950"/>
+  <p:sldSz cx="12192000" cy="3241675"/>
   <p:notesSz cx="6858000" cy="9144000"/>
   <p:defaultTextStyle>
     <a:defPPr>
@@ -104,13 +104,18 @@
       </a:defRPr>
     </a:lvl9pPr>
   </p:defaultTextStyle>
+  <p:extLst>
+    <p:ext uri="{EFAFB233-063F-42B5-8137-9DF3F51BA10A}">
+      <p15:sldGuideLst xmlns:p15="http://schemas.microsoft.com/office/powerpoint/2012/main"/>
+    </p:ext>
+  </p:extLst>
 </p:presentation>
 </file>
 
 <file path=ppt/revisionInfo.xml><?xml version="1.0" encoding="utf-8"?>
 <p1510:revInfo xmlns:a="http://schemas.openxmlformats.org/drawingml/2006/main" xmlns:r="http://schemas.openxmlformats.org/officeDocument/2006/relationships" xmlns:p1510="http://schemas.microsoft.com/office/powerpoint/2015/10/main">
   <p1510:revLst>
-    <p1510:client id="{9E258D4F-9D85-4E22-A43D-FC26D32356DD}" v="10" dt="2022-02-13T04:52:22.444"/>
+    <p1510:client id="{9E258D4F-9D85-4E22-A43D-FC26D32356DD}" v="19" dt="2022-02-13T06:34:01.557"/>
   </p1510:revLst>
 </p1510:revInfo>
 </file>
@@ -120,18 +125,18 @@
   <pc:docChgLst>
     <pc:chgData name="Percy Soto Becerra" userId="74d2a9162288af9c" providerId="LiveId" clId="{9E258D4F-9D85-4E22-A43D-FC26D32356DD}"/>
     <pc:docChg chg="undo redo custSel modSld modMainMaster">
-      <pc:chgData name="Percy Soto Becerra" userId="74d2a9162288af9c" providerId="LiveId" clId="{9E258D4F-9D85-4E22-A43D-FC26D32356DD}" dt="2022-02-13T04:52:24.821" v="22" actId="1076"/>
+      <pc:chgData name="Percy Soto Becerra" userId="74d2a9162288af9c" providerId="LiveId" clId="{9E258D4F-9D85-4E22-A43D-FC26D32356DD}" dt="2022-02-13T06:35:41.910" v="99" actId="1076"/>
       <pc:docMkLst>
         <pc:docMk/>
       </pc:docMkLst>
       <pc:sldChg chg="modSp mod">
-        <pc:chgData name="Percy Soto Becerra" userId="74d2a9162288af9c" providerId="LiveId" clId="{9E258D4F-9D85-4E22-A43D-FC26D32356DD}" dt="2022-02-13T04:52:24.821" v="22" actId="1076"/>
+        <pc:chgData name="Percy Soto Becerra" userId="74d2a9162288af9c" providerId="LiveId" clId="{9E258D4F-9D85-4E22-A43D-FC26D32356DD}" dt="2022-02-13T06:35:41.910" v="99" actId="1076"/>
         <pc:sldMkLst>
           <pc:docMk/>
           <pc:sldMk cId="3288410021" sldId="256"/>
         </pc:sldMkLst>
         <pc:spChg chg="mod">
-          <ac:chgData name="Percy Soto Becerra" userId="74d2a9162288af9c" providerId="LiveId" clId="{9E258D4F-9D85-4E22-A43D-FC26D32356DD}" dt="2022-02-13T04:52:24.821" v="22" actId="1076"/>
+          <ac:chgData name="Percy Soto Becerra" userId="74d2a9162288af9c" providerId="LiveId" clId="{9E258D4F-9D85-4E22-A43D-FC26D32356DD}" dt="2022-02-13T06:35:19.981" v="96" actId="1076"/>
           <ac:spMkLst>
             <pc:docMk/>
             <pc:sldMk cId="3288410021" sldId="256"/>
@@ -139,7 +144,7 @@
           </ac:spMkLst>
         </pc:spChg>
         <pc:spChg chg="mod">
-          <ac:chgData name="Percy Soto Becerra" userId="74d2a9162288af9c" providerId="LiveId" clId="{9E258D4F-9D85-4E22-A43D-FC26D32356DD}" dt="2022-02-13T04:52:24.350" v="21" actId="1076"/>
+          <ac:chgData name="Percy Soto Becerra" userId="74d2a9162288af9c" providerId="LiveId" clId="{9E258D4F-9D85-4E22-A43D-FC26D32356DD}" dt="2022-02-13T06:35:31.037" v="98" actId="1076"/>
           <ac:spMkLst>
             <pc:docMk/>
             <pc:sldMk cId="3288410021" sldId="256"/>
@@ -147,7 +152,7 @@
           </ac:spMkLst>
         </pc:spChg>
         <pc:spChg chg="mod">
-          <ac:chgData name="Percy Soto Becerra" userId="74d2a9162288af9c" providerId="LiveId" clId="{9E258D4F-9D85-4E22-A43D-FC26D32356DD}" dt="2022-02-13T04:52:22.444" v="18"/>
+          <ac:chgData name="Percy Soto Becerra" userId="74d2a9162288af9c" providerId="LiveId" clId="{9E258D4F-9D85-4E22-A43D-FC26D32356DD}" dt="2022-02-13T06:35:41.910" v="99" actId="1076"/>
           <ac:spMkLst>
             <pc:docMk/>
             <pc:sldMk cId="3288410021" sldId="256"/>
@@ -430,13 +435,13 @@
         </pc:sldLayoutChg>
       </pc:sldMasterChg>
       <pc:sldMasterChg chg="modSp modSldLayout">
-        <pc:chgData name="Percy Soto Becerra" userId="74d2a9162288af9c" providerId="LiveId" clId="{9E258D4F-9D85-4E22-A43D-FC26D32356DD}" dt="2022-02-13T04:52:22.444" v="18"/>
+        <pc:chgData name="Percy Soto Becerra" userId="74d2a9162288af9c" providerId="LiveId" clId="{9E258D4F-9D85-4E22-A43D-FC26D32356DD}" dt="2022-02-13T06:33:39.680" v="65"/>
         <pc:sldMasterMkLst>
           <pc:docMk/>
           <pc:sldMasterMk cId="3642792616" sldId="2147483684"/>
         </pc:sldMasterMkLst>
         <pc:spChg chg="mod">
-          <ac:chgData name="Percy Soto Becerra" userId="74d2a9162288af9c" providerId="LiveId" clId="{9E258D4F-9D85-4E22-A43D-FC26D32356DD}" dt="2022-02-13T04:52:22.444" v="18"/>
+          <ac:chgData name="Percy Soto Becerra" userId="74d2a9162288af9c" providerId="LiveId" clId="{9E258D4F-9D85-4E22-A43D-FC26D32356DD}" dt="2022-02-13T06:33:39.680" v="65"/>
           <ac:spMkLst>
             <pc:docMk/>
             <pc:sldMasterMk cId="3642792616" sldId="2147483684"/>
@@ -444,7 +449,7 @@
           </ac:spMkLst>
         </pc:spChg>
         <pc:spChg chg="mod">
-          <ac:chgData name="Percy Soto Becerra" userId="74d2a9162288af9c" providerId="LiveId" clId="{9E258D4F-9D85-4E22-A43D-FC26D32356DD}" dt="2022-02-13T04:52:22.444" v="18"/>
+          <ac:chgData name="Percy Soto Becerra" userId="74d2a9162288af9c" providerId="LiveId" clId="{9E258D4F-9D85-4E22-A43D-FC26D32356DD}" dt="2022-02-13T06:33:39.680" v="65"/>
           <ac:spMkLst>
             <pc:docMk/>
             <pc:sldMasterMk cId="3642792616" sldId="2147483684"/>
@@ -452,7 +457,7 @@
           </ac:spMkLst>
         </pc:spChg>
         <pc:spChg chg="mod">
-          <ac:chgData name="Percy Soto Becerra" userId="74d2a9162288af9c" providerId="LiveId" clId="{9E258D4F-9D85-4E22-A43D-FC26D32356DD}" dt="2022-02-13T04:52:22.444" v="18"/>
+          <ac:chgData name="Percy Soto Becerra" userId="74d2a9162288af9c" providerId="LiveId" clId="{9E258D4F-9D85-4E22-A43D-FC26D32356DD}" dt="2022-02-13T06:33:39.680" v="65"/>
           <ac:spMkLst>
             <pc:docMk/>
             <pc:sldMasterMk cId="3642792616" sldId="2147483684"/>
@@ -460,7 +465,7 @@
           </ac:spMkLst>
         </pc:spChg>
         <pc:spChg chg="mod">
-          <ac:chgData name="Percy Soto Becerra" userId="74d2a9162288af9c" providerId="LiveId" clId="{9E258D4F-9D85-4E22-A43D-FC26D32356DD}" dt="2022-02-13T04:52:22.444" v="18"/>
+          <ac:chgData name="Percy Soto Becerra" userId="74d2a9162288af9c" providerId="LiveId" clId="{9E258D4F-9D85-4E22-A43D-FC26D32356DD}" dt="2022-02-13T06:33:39.680" v="65"/>
           <ac:spMkLst>
             <pc:docMk/>
             <pc:sldMasterMk cId="3642792616" sldId="2147483684"/>
@@ -468,7 +473,7 @@
           </ac:spMkLst>
         </pc:spChg>
         <pc:spChg chg="mod">
-          <ac:chgData name="Percy Soto Becerra" userId="74d2a9162288af9c" providerId="LiveId" clId="{9E258D4F-9D85-4E22-A43D-FC26D32356DD}" dt="2022-02-13T04:52:22.444" v="18"/>
+          <ac:chgData name="Percy Soto Becerra" userId="74d2a9162288af9c" providerId="LiveId" clId="{9E258D4F-9D85-4E22-A43D-FC26D32356DD}" dt="2022-02-13T06:33:39.680" v="65"/>
           <ac:spMkLst>
             <pc:docMk/>
             <pc:sldMasterMk cId="3642792616" sldId="2147483684"/>
@@ -476,14 +481,14 @@
           </ac:spMkLst>
         </pc:spChg>
         <pc:sldLayoutChg chg="modSp">
-          <pc:chgData name="Percy Soto Becerra" userId="74d2a9162288af9c" providerId="LiveId" clId="{9E258D4F-9D85-4E22-A43D-FC26D32356DD}" dt="2022-02-13T04:52:22.444" v="18"/>
+          <pc:chgData name="Percy Soto Becerra" userId="74d2a9162288af9c" providerId="LiveId" clId="{9E258D4F-9D85-4E22-A43D-FC26D32356DD}" dt="2022-02-13T06:33:39.680" v="65"/>
           <pc:sldLayoutMkLst>
             <pc:docMk/>
             <pc:sldMasterMk cId="3642792616" sldId="2147483684"/>
             <pc:sldLayoutMk cId="2460793997" sldId="2147483685"/>
           </pc:sldLayoutMkLst>
           <pc:spChg chg="mod">
-            <ac:chgData name="Percy Soto Becerra" userId="74d2a9162288af9c" providerId="LiveId" clId="{9E258D4F-9D85-4E22-A43D-FC26D32356DD}" dt="2022-02-13T04:52:22.444" v="18"/>
+            <ac:chgData name="Percy Soto Becerra" userId="74d2a9162288af9c" providerId="LiveId" clId="{9E258D4F-9D85-4E22-A43D-FC26D32356DD}" dt="2022-02-13T06:33:39.680" v="65"/>
             <ac:spMkLst>
               <pc:docMk/>
               <pc:sldMasterMk cId="3642792616" sldId="2147483684"/>
@@ -492,7 +497,7 @@
             </ac:spMkLst>
           </pc:spChg>
           <pc:spChg chg="mod">
-            <ac:chgData name="Percy Soto Becerra" userId="74d2a9162288af9c" providerId="LiveId" clId="{9E258D4F-9D85-4E22-A43D-FC26D32356DD}" dt="2022-02-13T04:52:22.444" v="18"/>
+            <ac:chgData name="Percy Soto Becerra" userId="74d2a9162288af9c" providerId="LiveId" clId="{9E258D4F-9D85-4E22-A43D-FC26D32356DD}" dt="2022-02-13T06:33:39.680" v="65"/>
             <ac:spMkLst>
               <pc:docMk/>
               <pc:sldMasterMk cId="3642792616" sldId="2147483684"/>
@@ -502,14 +507,14 @@
           </pc:spChg>
         </pc:sldLayoutChg>
         <pc:sldLayoutChg chg="modSp">
-          <pc:chgData name="Percy Soto Becerra" userId="74d2a9162288af9c" providerId="LiveId" clId="{9E258D4F-9D85-4E22-A43D-FC26D32356DD}" dt="2022-02-13T04:52:22.444" v="18"/>
+          <pc:chgData name="Percy Soto Becerra" userId="74d2a9162288af9c" providerId="LiveId" clId="{9E258D4F-9D85-4E22-A43D-FC26D32356DD}" dt="2022-02-13T06:33:39.680" v="65"/>
           <pc:sldLayoutMkLst>
             <pc:docMk/>
             <pc:sldMasterMk cId="3642792616" sldId="2147483684"/>
             <pc:sldLayoutMk cId="2464003717" sldId="2147483687"/>
           </pc:sldLayoutMkLst>
           <pc:spChg chg="mod">
-            <ac:chgData name="Percy Soto Becerra" userId="74d2a9162288af9c" providerId="LiveId" clId="{9E258D4F-9D85-4E22-A43D-FC26D32356DD}" dt="2022-02-13T04:52:22.444" v="18"/>
+            <ac:chgData name="Percy Soto Becerra" userId="74d2a9162288af9c" providerId="LiveId" clId="{9E258D4F-9D85-4E22-A43D-FC26D32356DD}" dt="2022-02-13T06:33:39.680" v="65"/>
             <ac:spMkLst>
               <pc:docMk/>
               <pc:sldMasterMk cId="3642792616" sldId="2147483684"/>
@@ -518,7 +523,7 @@
             </ac:spMkLst>
           </pc:spChg>
           <pc:spChg chg="mod">
-            <ac:chgData name="Percy Soto Becerra" userId="74d2a9162288af9c" providerId="LiveId" clId="{9E258D4F-9D85-4E22-A43D-FC26D32356DD}" dt="2022-02-13T04:52:22.444" v="18"/>
+            <ac:chgData name="Percy Soto Becerra" userId="74d2a9162288af9c" providerId="LiveId" clId="{9E258D4F-9D85-4E22-A43D-FC26D32356DD}" dt="2022-02-13T06:33:39.680" v="65"/>
             <ac:spMkLst>
               <pc:docMk/>
               <pc:sldMasterMk cId="3642792616" sldId="2147483684"/>
@@ -528,14 +533,14 @@
           </pc:spChg>
         </pc:sldLayoutChg>
         <pc:sldLayoutChg chg="modSp">
-          <pc:chgData name="Percy Soto Becerra" userId="74d2a9162288af9c" providerId="LiveId" clId="{9E258D4F-9D85-4E22-A43D-FC26D32356DD}" dt="2022-02-13T04:52:22.444" v="18"/>
+          <pc:chgData name="Percy Soto Becerra" userId="74d2a9162288af9c" providerId="LiveId" clId="{9E258D4F-9D85-4E22-A43D-FC26D32356DD}" dt="2022-02-13T06:33:39.680" v="65"/>
           <pc:sldLayoutMkLst>
             <pc:docMk/>
             <pc:sldMasterMk cId="3642792616" sldId="2147483684"/>
             <pc:sldLayoutMk cId="1664182377" sldId="2147483688"/>
           </pc:sldLayoutMkLst>
           <pc:spChg chg="mod">
-            <ac:chgData name="Percy Soto Becerra" userId="74d2a9162288af9c" providerId="LiveId" clId="{9E258D4F-9D85-4E22-A43D-FC26D32356DD}" dt="2022-02-13T04:52:22.444" v="18"/>
+            <ac:chgData name="Percy Soto Becerra" userId="74d2a9162288af9c" providerId="LiveId" clId="{9E258D4F-9D85-4E22-A43D-FC26D32356DD}" dt="2022-02-13T06:33:39.680" v="65"/>
             <ac:spMkLst>
               <pc:docMk/>
               <pc:sldMasterMk cId="3642792616" sldId="2147483684"/>
@@ -544,7 +549,7 @@
             </ac:spMkLst>
           </pc:spChg>
           <pc:spChg chg="mod">
-            <ac:chgData name="Percy Soto Becerra" userId="74d2a9162288af9c" providerId="LiveId" clId="{9E258D4F-9D85-4E22-A43D-FC26D32356DD}" dt="2022-02-13T04:52:22.444" v="18"/>
+            <ac:chgData name="Percy Soto Becerra" userId="74d2a9162288af9c" providerId="LiveId" clId="{9E258D4F-9D85-4E22-A43D-FC26D32356DD}" dt="2022-02-13T06:33:39.680" v="65"/>
             <ac:spMkLst>
               <pc:docMk/>
               <pc:sldMasterMk cId="3642792616" sldId="2147483684"/>
@@ -554,14 +559,14 @@
           </pc:spChg>
         </pc:sldLayoutChg>
         <pc:sldLayoutChg chg="modSp">
-          <pc:chgData name="Percy Soto Becerra" userId="74d2a9162288af9c" providerId="LiveId" clId="{9E258D4F-9D85-4E22-A43D-FC26D32356DD}" dt="2022-02-13T04:52:22.444" v="18"/>
+          <pc:chgData name="Percy Soto Becerra" userId="74d2a9162288af9c" providerId="LiveId" clId="{9E258D4F-9D85-4E22-A43D-FC26D32356DD}" dt="2022-02-13T06:33:39.680" v="65"/>
           <pc:sldLayoutMkLst>
             <pc:docMk/>
             <pc:sldMasterMk cId="3642792616" sldId="2147483684"/>
             <pc:sldLayoutMk cId="3772940880" sldId="2147483689"/>
           </pc:sldLayoutMkLst>
           <pc:spChg chg="mod">
-            <ac:chgData name="Percy Soto Becerra" userId="74d2a9162288af9c" providerId="LiveId" clId="{9E258D4F-9D85-4E22-A43D-FC26D32356DD}" dt="2022-02-13T04:52:22.444" v="18"/>
+            <ac:chgData name="Percy Soto Becerra" userId="74d2a9162288af9c" providerId="LiveId" clId="{9E258D4F-9D85-4E22-A43D-FC26D32356DD}" dt="2022-02-13T06:33:39.680" v="65"/>
             <ac:spMkLst>
               <pc:docMk/>
               <pc:sldMasterMk cId="3642792616" sldId="2147483684"/>
@@ -570,7 +575,7 @@
             </ac:spMkLst>
           </pc:spChg>
           <pc:spChg chg="mod">
-            <ac:chgData name="Percy Soto Becerra" userId="74d2a9162288af9c" providerId="LiveId" clId="{9E258D4F-9D85-4E22-A43D-FC26D32356DD}" dt="2022-02-13T04:52:22.444" v="18"/>
+            <ac:chgData name="Percy Soto Becerra" userId="74d2a9162288af9c" providerId="LiveId" clId="{9E258D4F-9D85-4E22-A43D-FC26D32356DD}" dt="2022-02-13T06:33:39.680" v="65"/>
             <ac:spMkLst>
               <pc:docMk/>
               <pc:sldMasterMk cId="3642792616" sldId="2147483684"/>
@@ -579,7 +584,7 @@
             </ac:spMkLst>
           </pc:spChg>
           <pc:spChg chg="mod">
-            <ac:chgData name="Percy Soto Becerra" userId="74d2a9162288af9c" providerId="LiveId" clId="{9E258D4F-9D85-4E22-A43D-FC26D32356DD}" dt="2022-02-13T04:52:22.444" v="18"/>
+            <ac:chgData name="Percy Soto Becerra" userId="74d2a9162288af9c" providerId="LiveId" clId="{9E258D4F-9D85-4E22-A43D-FC26D32356DD}" dt="2022-02-13T06:33:39.680" v="65"/>
             <ac:spMkLst>
               <pc:docMk/>
               <pc:sldMasterMk cId="3642792616" sldId="2147483684"/>
@@ -588,7 +593,7 @@
             </ac:spMkLst>
           </pc:spChg>
           <pc:spChg chg="mod">
-            <ac:chgData name="Percy Soto Becerra" userId="74d2a9162288af9c" providerId="LiveId" clId="{9E258D4F-9D85-4E22-A43D-FC26D32356DD}" dt="2022-02-13T04:52:22.444" v="18"/>
+            <ac:chgData name="Percy Soto Becerra" userId="74d2a9162288af9c" providerId="LiveId" clId="{9E258D4F-9D85-4E22-A43D-FC26D32356DD}" dt="2022-02-13T06:33:39.680" v="65"/>
             <ac:spMkLst>
               <pc:docMk/>
               <pc:sldMasterMk cId="3642792616" sldId="2147483684"/>
@@ -597,7 +602,7 @@
             </ac:spMkLst>
           </pc:spChg>
           <pc:spChg chg="mod">
-            <ac:chgData name="Percy Soto Becerra" userId="74d2a9162288af9c" providerId="LiveId" clId="{9E258D4F-9D85-4E22-A43D-FC26D32356DD}" dt="2022-02-13T04:52:22.444" v="18"/>
+            <ac:chgData name="Percy Soto Becerra" userId="74d2a9162288af9c" providerId="LiveId" clId="{9E258D4F-9D85-4E22-A43D-FC26D32356DD}" dt="2022-02-13T06:33:39.680" v="65"/>
             <ac:spMkLst>
               <pc:docMk/>
               <pc:sldMasterMk cId="3642792616" sldId="2147483684"/>
@@ -607,14 +612,14 @@
           </pc:spChg>
         </pc:sldLayoutChg>
         <pc:sldLayoutChg chg="modSp">
-          <pc:chgData name="Percy Soto Becerra" userId="74d2a9162288af9c" providerId="LiveId" clId="{9E258D4F-9D85-4E22-A43D-FC26D32356DD}" dt="2022-02-13T04:52:22.444" v="18"/>
+          <pc:chgData name="Percy Soto Becerra" userId="74d2a9162288af9c" providerId="LiveId" clId="{9E258D4F-9D85-4E22-A43D-FC26D32356DD}" dt="2022-02-13T06:33:39.680" v="65"/>
           <pc:sldLayoutMkLst>
             <pc:docMk/>
             <pc:sldMasterMk cId="3642792616" sldId="2147483684"/>
             <pc:sldLayoutMk cId="1060079512" sldId="2147483692"/>
           </pc:sldLayoutMkLst>
           <pc:spChg chg="mod">
-            <ac:chgData name="Percy Soto Becerra" userId="74d2a9162288af9c" providerId="LiveId" clId="{9E258D4F-9D85-4E22-A43D-FC26D32356DD}" dt="2022-02-13T04:52:22.444" v="18"/>
+            <ac:chgData name="Percy Soto Becerra" userId="74d2a9162288af9c" providerId="LiveId" clId="{9E258D4F-9D85-4E22-A43D-FC26D32356DD}" dt="2022-02-13T06:33:39.680" v="65"/>
             <ac:spMkLst>
               <pc:docMk/>
               <pc:sldMasterMk cId="3642792616" sldId="2147483684"/>
@@ -623,7 +628,7 @@
             </ac:spMkLst>
           </pc:spChg>
           <pc:spChg chg="mod">
-            <ac:chgData name="Percy Soto Becerra" userId="74d2a9162288af9c" providerId="LiveId" clId="{9E258D4F-9D85-4E22-A43D-FC26D32356DD}" dt="2022-02-13T04:52:22.444" v="18"/>
+            <ac:chgData name="Percy Soto Becerra" userId="74d2a9162288af9c" providerId="LiveId" clId="{9E258D4F-9D85-4E22-A43D-FC26D32356DD}" dt="2022-02-13T06:33:39.680" v="65"/>
             <ac:spMkLst>
               <pc:docMk/>
               <pc:sldMasterMk cId="3642792616" sldId="2147483684"/>
@@ -632,7 +637,7 @@
             </ac:spMkLst>
           </pc:spChg>
           <pc:spChg chg="mod">
-            <ac:chgData name="Percy Soto Becerra" userId="74d2a9162288af9c" providerId="LiveId" clId="{9E258D4F-9D85-4E22-A43D-FC26D32356DD}" dt="2022-02-13T04:52:22.444" v="18"/>
+            <ac:chgData name="Percy Soto Becerra" userId="74d2a9162288af9c" providerId="LiveId" clId="{9E258D4F-9D85-4E22-A43D-FC26D32356DD}" dt="2022-02-13T06:33:39.680" v="65"/>
             <ac:spMkLst>
               <pc:docMk/>
               <pc:sldMasterMk cId="3642792616" sldId="2147483684"/>
@@ -642,14 +647,14 @@
           </pc:spChg>
         </pc:sldLayoutChg>
         <pc:sldLayoutChg chg="modSp">
-          <pc:chgData name="Percy Soto Becerra" userId="74d2a9162288af9c" providerId="LiveId" clId="{9E258D4F-9D85-4E22-A43D-FC26D32356DD}" dt="2022-02-13T04:52:22.444" v="18"/>
+          <pc:chgData name="Percy Soto Becerra" userId="74d2a9162288af9c" providerId="LiveId" clId="{9E258D4F-9D85-4E22-A43D-FC26D32356DD}" dt="2022-02-13T06:33:39.680" v="65"/>
           <pc:sldLayoutMkLst>
             <pc:docMk/>
             <pc:sldMasterMk cId="3642792616" sldId="2147483684"/>
             <pc:sldLayoutMk cId="3122386555" sldId="2147483693"/>
           </pc:sldLayoutMkLst>
           <pc:spChg chg="mod">
-            <ac:chgData name="Percy Soto Becerra" userId="74d2a9162288af9c" providerId="LiveId" clId="{9E258D4F-9D85-4E22-A43D-FC26D32356DD}" dt="2022-02-13T04:52:22.444" v="18"/>
+            <ac:chgData name="Percy Soto Becerra" userId="74d2a9162288af9c" providerId="LiveId" clId="{9E258D4F-9D85-4E22-A43D-FC26D32356DD}" dt="2022-02-13T06:33:39.680" v="65"/>
             <ac:spMkLst>
               <pc:docMk/>
               <pc:sldMasterMk cId="3642792616" sldId="2147483684"/>
@@ -658,7 +663,7 @@
             </ac:spMkLst>
           </pc:spChg>
           <pc:spChg chg="mod">
-            <ac:chgData name="Percy Soto Becerra" userId="74d2a9162288af9c" providerId="LiveId" clId="{9E258D4F-9D85-4E22-A43D-FC26D32356DD}" dt="2022-02-13T04:52:22.444" v="18"/>
+            <ac:chgData name="Percy Soto Becerra" userId="74d2a9162288af9c" providerId="LiveId" clId="{9E258D4F-9D85-4E22-A43D-FC26D32356DD}" dt="2022-02-13T06:33:39.680" v="65"/>
             <ac:spMkLst>
               <pc:docMk/>
               <pc:sldMasterMk cId="3642792616" sldId="2147483684"/>
@@ -667,7 +672,7 @@
             </ac:spMkLst>
           </pc:spChg>
           <pc:spChg chg="mod">
-            <ac:chgData name="Percy Soto Becerra" userId="74d2a9162288af9c" providerId="LiveId" clId="{9E258D4F-9D85-4E22-A43D-FC26D32356DD}" dt="2022-02-13T04:52:22.444" v="18"/>
+            <ac:chgData name="Percy Soto Becerra" userId="74d2a9162288af9c" providerId="LiveId" clId="{9E258D4F-9D85-4E22-A43D-FC26D32356DD}" dt="2022-02-13T06:33:39.680" v="65"/>
             <ac:spMkLst>
               <pc:docMk/>
               <pc:sldMasterMk cId="3642792616" sldId="2147483684"/>
@@ -677,14 +682,14 @@
           </pc:spChg>
         </pc:sldLayoutChg>
         <pc:sldLayoutChg chg="modSp">
-          <pc:chgData name="Percy Soto Becerra" userId="74d2a9162288af9c" providerId="LiveId" clId="{9E258D4F-9D85-4E22-A43D-FC26D32356DD}" dt="2022-02-13T04:52:22.444" v="18"/>
+          <pc:chgData name="Percy Soto Becerra" userId="74d2a9162288af9c" providerId="LiveId" clId="{9E258D4F-9D85-4E22-A43D-FC26D32356DD}" dt="2022-02-13T06:33:39.680" v="65"/>
           <pc:sldLayoutMkLst>
             <pc:docMk/>
             <pc:sldMasterMk cId="3642792616" sldId="2147483684"/>
             <pc:sldLayoutMk cId="3743415676" sldId="2147483695"/>
           </pc:sldLayoutMkLst>
           <pc:spChg chg="mod">
-            <ac:chgData name="Percy Soto Becerra" userId="74d2a9162288af9c" providerId="LiveId" clId="{9E258D4F-9D85-4E22-A43D-FC26D32356DD}" dt="2022-02-13T04:52:22.444" v="18"/>
+            <ac:chgData name="Percy Soto Becerra" userId="74d2a9162288af9c" providerId="LiveId" clId="{9E258D4F-9D85-4E22-A43D-FC26D32356DD}" dt="2022-02-13T06:33:39.680" v="65"/>
             <ac:spMkLst>
               <pc:docMk/>
               <pc:sldMasterMk cId="3642792616" sldId="2147483684"/>
@@ -693,11 +698,285 @@
             </ac:spMkLst>
           </pc:spChg>
           <pc:spChg chg="mod">
-            <ac:chgData name="Percy Soto Becerra" userId="74d2a9162288af9c" providerId="LiveId" clId="{9E258D4F-9D85-4E22-A43D-FC26D32356DD}" dt="2022-02-13T04:52:22.444" v="18"/>
+            <ac:chgData name="Percy Soto Becerra" userId="74d2a9162288af9c" providerId="LiveId" clId="{9E258D4F-9D85-4E22-A43D-FC26D32356DD}" dt="2022-02-13T06:33:39.680" v="65"/>
             <ac:spMkLst>
               <pc:docMk/>
               <pc:sldMasterMk cId="3642792616" sldId="2147483684"/>
               <pc:sldLayoutMk cId="3743415676" sldId="2147483695"/>
+              <ac:spMk id="3" creationId="{00000000-0000-0000-0000-000000000000}"/>
+            </ac:spMkLst>
+          </pc:spChg>
+        </pc:sldLayoutChg>
+      </pc:sldMasterChg>
+      <pc:sldMasterChg chg="modSp modSldLayout">
+        <pc:chgData name="Percy Soto Becerra" userId="74d2a9162288af9c" providerId="LiveId" clId="{9E258D4F-9D85-4E22-A43D-FC26D32356DD}" dt="2022-02-13T06:33:36.617" v="49"/>
+        <pc:sldMasterMkLst>
+          <pc:docMk/>
+          <pc:sldMasterMk cId="2673026033" sldId="2147483696"/>
+        </pc:sldMasterMkLst>
+        <pc:spChg chg="mod">
+          <ac:chgData name="Percy Soto Becerra" userId="74d2a9162288af9c" providerId="LiveId" clId="{9E258D4F-9D85-4E22-A43D-FC26D32356DD}" dt="2022-02-13T06:33:36.617" v="49"/>
+          <ac:spMkLst>
+            <pc:docMk/>
+            <pc:sldMasterMk cId="2673026033" sldId="2147483696"/>
+            <ac:spMk id="2" creationId="{00000000-0000-0000-0000-000000000000}"/>
+          </ac:spMkLst>
+        </pc:spChg>
+        <pc:spChg chg="mod">
+          <ac:chgData name="Percy Soto Becerra" userId="74d2a9162288af9c" providerId="LiveId" clId="{9E258D4F-9D85-4E22-A43D-FC26D32356DD}" dt="2022-02-13T06:33:36.617" v="49"/>
+          <ac:spMkLst>
+            <pc:docMk/>
+            <pc:sldMasterMk cId="2673026033" sldId="2147483696"/>
+            <ac:spMk id="3" creationId="{00000000-0000-0000-0000-000000000000}"/>
+          </ac:spMkLst>
+        </pc:spChg>
+        <pc:spChg chg="mod">
+          <ac:chgData name="Percy Soto Becerra" userId="74d2a9162288af9c" providerId="LiveId" clId="{9E258D4F-9D85-4E22-A43D-FC26D32356DD}" dt="2022-02-13T06:33:36.617" v="49"/>
+          <ac:spMkLst>
+            <pc:docMk/>
+            <pc:sldMasterMk cId="2673026033" sldId="2147483696"/>
+            <ac:spMk id="4" creationId="{00000000-0000-0000-0000-000000000000}"/>
+          </ac:spMkLst>
+        </pc:spChg>
+        <pc:spChg chg="mod">
+          <ac:chgData name="Percy Soto Becerra" userId="74d2a9162288af9c" providerId="LiveId" clId="{9E258D4F-9D85-4E22-A43D-FC26D32356DD}" dt="2022-02-13T06:33:36.617" v="49"/>
+          <ac:spMkLst>
+            <pc:docMk/>
+            <pc:sldMasterMk cId="2673026033" sldId="2147483696"/>
+            <ac:spMk id="5" creationId="{00000000-0000-0000-0000-000000000000}"/>
+          </ac:spMkLst>
+        </pc:spChg>
+        <pc:spChg chg="mod">
+          <ac:chgData name="Percy Soto Becerra" userId="74d2a9162288af9c" providerId="LiveId" clId="{9E258D4F-9D85-4E22-A43D-FC26D32356DD}" dt="2022-02-13T06:33:36.617" v="49"/>
+          <ac:spMkLst>
+            <pc:docMk/>
+            <pc:sldMasterMk cId="2673026033" sldId="2147483696"/>
+            <ac:spMk id="6" creationId="{00000000-0000-0000-0000-000000000000}"/>
+          </ac:spMkLst>
+        </pc:spChg>
+        <pc:sldLayoutChg chg="modSp">
+          <pc:chgData name="Percy Soto Becerra" userId="74d2a9162288af9c" providerId="LiveId" clId="{9E258D4F-9D85-4E22-A43D-FC26D32356DD}" dt="2022-02-13T06:33:36.617" v="49"/>
+          <pc:sldLayoutMkLst>
+            <pc:docMk/>
+            <pc:sldMasterMk cId="2673026033" sldId="2147483696"/>
+            <pc:sldLayoutMk cId="1135429846" sldId="2147483697"/>
+          </pc:sldLayoutMkLst>
+          <pc:spChg chg="mod">
+            <ac:chgData name="Percy Soto Becerra" userId="74d2a9162288af9c" providerId="LiveId" clId="{9E258D4F-9D85-4E22-A43D-FC26D32356DD}" dt="2022-02-13T06:33:36.617" v="49"/>
+            <ac:spMkLst>
+              <pc:docMk/>
+              <pc:sldMasterMk cId="2673026033" sldId="2147483696"/>
+              <pc:sldLayoutMk cId="1135429846" sldId="2147483697"/>
+              <ac:spMk id="2" creationId="{00000000-0000-0000-0000-000000000000}"/>
+            </ac:spMkLst>
+          </pc:spChg>
+          <pc:spChg chg="mod">
+            <ac:chgData name="Percy Soto Becerra" userId="74d2a9162288af9c" providerId="LiveId" clId="{9E258D4F-9D85-4E22-A43D-FC26D32356DD}" dt="2022-02-13T06:33:36.617" v="49"/>
+            <ac:spMkLst>
+              <pc:docMk/>
+              <pc:sldMasterMk cId="2673026033" sldId="2147483696"/>
+              <pc:sldLayoutMk cId="1135429846" sldId="2147483697"/>
+              <ac:spMk id="3" creationId="{00000000-0000-0000-0000-000000000000}"/>
+            </ac:spMkLst>
+          </pc:spChg>
+        </pc:sldLayoutChg>
+        <pc:sldLayoutChg chg="modSp">
+          <pc:chgData name="Percy Soto Becerra" userId="74d2a9162288af9c" providerId="LiveId" clId="{9E258D4F-9D85-4E22-A43D-FC26D32356DD}" dt="2022-02-13T06:33:36.617" v="49"/>
+          <pc:sldLayoutMkLst>
+            <pc:docMk/>
+            <pc:sldMasterMk cId="2673026033" sldId="2147483696"/>
+            <pc:sldLayoutMk cId="1393951687" sldId="2147483699"/>
+          </pc:sldLayoutMkLst>
+          <pc:spChg chg="mod">
+            <ac:chgData name="Percy Soto Becerra" userId="74d2a9162288af9c" providerId="LiveId" clId="{9E258D4F-9D85-4E22-A43D-FC26D32356DD}" dt="2022-02-13T06:33:36.617" v="49"/>
+            <ac:spMkLst>
+              <pc:docMk/>
+              <pc:sldMasterMk cId="2673026033" sldId="2147483696"/>
+              <pc:sldLayoutMk cId="1393951687" sldId="2147483699"/>
+              <ac:spMk id="2" creationId="{00000000-0000-0000-0000-000000000000}"/>
+            </ac:spMkLst>
+          </pc:spChg>
+          <pc:spChg chg="mod">
+            <ac:chgData name="Percy Soto Becerra" userId="74d2a9162288af9c" providerId="LiveId" clId="{9E258D4F-9D85-4E22-A43D-FC26D32356DD}" dt="2022-02-13T06:33:36.617" v="49"/>
+            <ac:spMkLst>
+              <pc:docMk/>
+              <pc:sldMasterMk cId="2673026033" sldId="2147483696"/>
+              <pc:sldLayoutMk cId="1393951687" sldId="2147483699"/>
+              <ac:spMk id="3" creationId="{00000000-0000-0000-0000-000000000000}"/>
+            </ac:spMkLst>
+          </pc:spChg>
+        </pc:sldLayoutChg>
+        <pc:sldLayoutChg chg="modSp">
+          <pc:chgData name="Percy Soto Becerra" userId="74d2a9162288af9c" providerId="LiveId" clId="{9E258D4F-9D85-4E22-A43D-FC26D32356DD}" dt="2022-02-13T06:33:36.617" v="49"/>
+          <pc:sldLayoutMkLst>
+            <pc:docMk/>
+            <pc:sldMasterMk cId="2673026033" sldId="2147483696"/>
+            <pc:sldLayoutMk cId="1299621213" sldId="2147483700"/>
+          </pc:sldLayoutMkLst>
+          <pc:spChg chg="mod">
+            <ac:chgData name="Percy Soto Becerra" userId="74d2a9162288af9c" providerId="LiveId" clId="{9E258D4F-9D85-4E22-A43D-FC26D32356DD}" dt="2022-02-13T06:33:36.617" v="49"/>
+            <ac:spMkLst>
+              <pc:docMk/>
+              <pc:sldMasterMk cId="2673026033" sldId="2147483696"/>
+              <pc:sldLayoutMk cId="1299621213" sldId="2147483700"/>
+              <ac:spMk id="3" creationId="{00000000-0000-0000-0000-000000000000}"/>
+            </ac:spMkLst>
+          </pc:spChg>
+          <pc:spChg chg="mod">
+            <ac:chgData name="Percy Soto Becerra" userId="74d2a9162288af9c" providerId="LiveId" clId="{9E258D4F-9D85-4E22-A43D-FC26D32356DD}" dt="2022-02-13T06:33:36.617" v="49"/>
+            <ac:spMkLst>
+              <pc:docMk/>
+              <pc:sldMasterMk cId="2673026033" sldId="2147483696"/>
+              <pc:sldLayoutMk cId="1299621213" sldId="2147483700"/>
+              <ac:spMk id="4" creationId="{00000000-0000-0000-0000-000000000000}"/>
+            </ac:spMkLst>
+          </pc:spChg>
+        </pc:sldLayoutChg>
+        <pc:sldLayoutChg chg="modSp">
+          <pc:chgData name="Percy Soto Becerra" userId="74d2a9162288af9c" providerId="LiveId" clId="{9E258D4F-9D85-4E22-A43D-FC26D32356DD}" dt="2022-02-13T06:33:36.617" v="49"/>
+          <pc:sldLayoutMkLst>
+            <pc:docMk/>
+            <pc:sldMasterMk cId="2673026033" sldId="2147483696"/>
+            <pc:sldLayoutMk cId="4074824262" sldId="2147483701"/>
+          </pc:sldLayoutMkLst>
+          <pc:spChg chg="mod">
+            <ac:chgData name="Percy Soto Becerra" userId="74d2a9162288af9c" providerId="LiveId" clId="{9E258D4F-9D85-4E22-A43D-FC26D32356DD}" dt="2022-02-13T06:33:36.617" v="49"/>
+            <ac:spMkLst>
+              <pc:docMk/>
+              <pc:sldMasterMk cId="2673026033" sldId="2147483696"/>
+              <pc:sldLayoutMk cId="4074824262" sldId="2147483701"/>
+              <ac:spMk id="2" creationId="{00000000-0000-0000-0000-000000000000}"/>
+            </ac:spMkLst>
+          </pc:spChg>
+          <pc:spChg chg="mod">
+            <ac:chgData name="Percy Soto Becerra" userId="74d2a9162288af9c" providerId="LiveId" clId="{9E258D4F-9D85-4E22-A43D-FC26D32356DD}" dt="2022-02-13T06:33:36.617" v="49"/>
+            <ac:spMkLst>
+              <pc:docMk/>
+              <pc:sldMasterMk cId="2673026033" sldId="2147483696"/>
+              <pc:sldLayoutMk cId="4074824262" sldId="2147483701"/>
+              <ac:spMk id="3" creationId="{00000000-0000-0000-0000-000000000000}"/>
+            </ac:spMkLst>
+          </pc:spChg>
+          <pc:spChg chg="mod">
+            <ac:chgData name="Percy Soto Becerra" userId="74d2a9162288af9c" providerId="LiveId" clId="{9E258D4F-9D85-4E22-A43D-FC26D32356DD}" dt="2022-02-13T06:33:36.617" v="49"/>
+            <ac:spMkLst>
+              <pc:docMk/>
+              <pc:sldMasterMk cId="2673026033" sldId="2147483696"/>
+              <pc:sldLayoutMk cId="4074824262" sldId="2147483701"/>
+              <ac:spMk id="4" creationId="{00000000-0000-0000-0000-000000000000}"/>
+            </ac:spMkLst>
+          </pc:spChg>
+          <pc:spChg chg="mod">
+            <ac:chgData name="Percy Soto Becerra" userId="74d2a9162288af9c" providerId="LiveId" clId="{9E258D4F-9D85-4E22-A43D-FC26D32356DD}" dt="2022-02-13T06:33:36.617" v="49"/>
+            <ac:spMkLst>
+              <pc:docMk/>
+              <pc:sldMasterMk cId="2673026033" sldId="2147483696"/>
+              <pc:sldLayoutMk cId="4074824262" sldId="2147483701"/>
+              <ac:spMk id="5" creationId="{00000000-0000-0000-0000-000000000000}"/>
+            </ac:spMkLst>
+          </pc:spChg>
+          <pc:spChg chg="mod">
+            <ac:chgData name="Percy Soto Becerra" userId="74d2a9162288af9c" providerId="LiveId" clId="{9E258D4F-9D85-4E22-A43D-FC26D32356DD}" dt="2022-02-13T06:33:36.617" v="49"/>
+            <ac:spMkLst>
+              <pc:docMk/>
+              <pc:sldMasterMk cId="2673026033" sldId="2147483696"/>
+              <pc:sldLayoutMk cId="4074824262" sldId="2147483701"/>
+              <ac:spMk id="6" creationId="{00000000-0000-0000-0000-000000000000}"/>
+            </ac:spMkLst>
+          </pc:spChg>
+        </pc:sldLayoutChg>
+        <pc:sldLayoutChg chg="modSp">
+          <pc:chgData name="Percy Soto Becerra" userId="74d2a9162288af9c" providerId="LiveId" clId="{9E258D4F-9D85-4E22-A43D-FC26D32356DD}" dt="2022-02-13T06:33:36.617" v="49"/>
+          <pc:sldLayoutMkLst>
+            <pc:docMk/>
+            <pc:sldMasterMk cId="2673026033" sldId="2147483696"/>
+            <pc:sldLayoutMk cId="164783202" sldId="2147483704"/>
+          </pc:sldLayoutMkLst>
+          <pc:spChg chg="mod">
+            <ac:chgData name="Percy Soto Becerra" userId="74d2a9162288af9c" providerId="LiveId" clId="{9E258D4F-9D85-4E22-A43D-FC26D32356DD}" dt="2022-02-13T06:33:36.617" v="49"/>
+            <ac:spMkLst>
+              <pc:docMk/>
+              <pc:sldMasterMk cId="2673026033" sldId="2147483696"/>
+              <pc:sldLayoutMk cId="164783202" sldId="2147483704"/>
+              <ac:spMk id="2" creationId="{00000000-0000-0000-0000-000000000000}"/>
+            </ac:spMkLst>
+          </pc:spChg>
+          <pc:spChg chg="mod">
+            <ac:chgData name="Percy Soto Becerra" userId="74d2a9162288af9c" providerId="LiveId" clId="{9E258D4F-9D85-4E22-A43D-FC26D32356DD}" dt="2022-02-13T06:33:36.617" v="49"/>
+            <ac:spMkLst>
+              <pc:docMk/>
+              <pc:sldMasterMk cId="2673026033" sldId="2147483696"/>
+              <pc:sldLayoutMk cId="164783202" sldId="2147483704"/>
+              <ac:spMk id="3" creationId="{00000000-0000-0000-0000-000000000000}"/>
+            </ac:spMkLst>
+          </pc:spChg>
+          <pc:spChg chg="mod">
+            <ac:chgData name="Percy Soto Becerra" userId="74d2a9162288af9c" providerId="LiveId" clId="{9E258D4F-9D85-4E22-A43D-FC26D32356DD}" dt="2022-02-13T06:33:36.617" v="49"/>
+            <ac:spMkLst>
+              <pc:docMk/>
+              <pc:sldMasterMk cId="2673026033" sldId="2147483696"/>
+              <pc:sldLayoutMk cId="164783202" sldId="2147483704"/>
+              <ac:spMk id="4" creationId="{00000000-0000-0000-0000-000000000000}"/>
+            </ac:spMkLst>
+          </pc:spChg>
+        </pc:sldLayoutChg>
+        <pc:sldLayoutChg chg="modSp">
+          <pc:chgData name="Percy Soto Becerra" userId="74d2a9162288af9c" providerId="LiveId" clId="{9E258D4F-9D85-4E22-A43D-FC26D32356DD}" dt="2022-02-13T06:33:36.617" v="49"/>
+          <pc:sldLayoutMkLst>
+            <pc:docMk/>
+            <pc:sldMasterMk cId="2673026033" sldId="2147483696"/>
+            <pc:sldLayoutMk cId="493199060" sldId="2147483705"/>
+          </pc:sldLayoutMkLst>
+          <pc:spChg chg="mod">
+            <ac:chgData name="Percy Soto Becerra" userId="74d2a9162288af9c" providerId="LiveId" clId="{9E258D4F-9D85-4E22-A43D-FC26D32356DD}" dt="2022-02-13T06:33:36.617" v="49"/>
+            <ac:spMkLst>
+              <pc:docMk/>
+              <pc:sldMasterMk cId="2673026033" sldId="2147483696"/>
+              <pc:sldLayoutMk cId="493199060" sldId="2147483705"/>
+              <ac:spMk id="2" creationId="{00000000-0000-0000-0000-000000000000}"/>
+            </ac:spMkLst>
+          </pc:spChg>
+          <pc:spChg chg="mod">
+            <ac:chgData name="Percy Soto Becerra" userId="74d2a9162288af9c" providerId="LiveId" clId="{9E258D4F-9D85-4E22-A43D-FC26D32356DD}" dt="2022-02-13T06:33:36.617" v="49"/>
+            <ac:spMkLst>
+              <pc:docMk/>
+              <pc:sldMasterMk cId="2673026033" sldId="2147483696"/>
+              <pc:sldLayoutMk cId="493199060" sldId="2147483705"/>
+              <ac:spMk id="3" creationId="{00000000-0000-0000-0000-000000000000}"/>
+            </ac:spMkLst>
+          </pc:spChg>
+          <pc:spChg chg="mod">
+            <ac:chgData name="Percy Soto Becerra" userId="74d2a9162288af9c" providerId="LiveId" clId="{9E258D4F-9D85-4E22-A43D-FC26D32356DD}" dt="2022-02-13T06:33:36.617" v="49"/>
+            <ac:spMkLst>
+              <pc:docMk/>
+              <pc:sldMasterMk cId="2673026033" sldId="2147483696"/>
+              <pc:sldLayoutMk cId="493199060" sldId="2147483705"/>
+              <ac:spMk id="4" creationId="{00000000-0000-0000-0000-000000000000}"/>
+            </ac:spMkLst>
+          </pc:spChg>
+        </pc:sldLayoutChg>
+        <pc:sldLayoutChg chg="modSp">
+          <pc:chgData name="Percy Soto Becerra" userId="74d2a9162288af9c" providerId="LiveId" clId="{9E258D4F-9D85-4E22-A43D-FC26D32356DD}" dt="2022-02-13T06:33:36.617" v="49"/>
+          <pc:sldLayoutMkLst>
+            <pc:docMk/>
+            <pc:sldMasterMk cId="2673026033" sldId="2147483696"/>
+            <pc:sldLayoutMk cId="1393150430" sldId="2147483707"/>
+          </pc:sldLayoutMkLst>
+          <pc:spChg chg="mod">
+            <ac:chgData name="Percy Soto Becerra" userId="74d2a9162288af9c" providerId="LiveId" clId="{9E258D4F-9D85-4E22-A43D-FC26D32356DD}" dt="2022-02-13T06:33:36.617" v="49"/>
+            <ac:spMkLst>
+              <pc:docMk/>
+              <pc:sldMasterMk cId="2673026033" sldId="2147483696"/>
+              <pc:sldLayoutMk cId="1393150430" sldId="2147483707"/>
+              <ac:spMk id="2" creationId="{00000000-0000-0000-0000-000000000000}"/>
+            </ac:spMkLst>
+          </pc:spChg>
+          <pc:spChg chg="mod">
+            <ac:chgData name="Percy Soto Becerra" userId="74d2a9162288af9c" providerId="LiveId" clId="{9E258D4F-9D85-4E22-A43D-FC26D32356DD}" dt="2022-02-13T06:33:36.617" v="49"/>
+            <ac:spMkLst>
+              <pc:docMk/>
+              <pc:sldMasterMk cId="2673026033" sldId="2147483696"/>
+              <pc:sldLayoutMk cId="1393150430" sldId="2147483707"/>
               <ac:spMk id="3" creationId="{00000000-0000-0000-0000-000000000000}"/>
             </ac:spMkLst>
           </pc:spChg>
@@ -1246,6 +1525,554 @@
               <pc:docMk/>
               <pc:sldMasterMk cId="1303831215" sldId="2147483708"/>
               <pc:sldLayoutMk cId="1418038234" sldId="2147483719"/>
+              <ac:spMk id="3" creationId="{00000000-0000-0000-0000-000000000000}"/>
+            </ac:spMkLst>
+          </pc:spChg>
+        </pc:sldLayoutChg>
+      </pc:sldMasterChg>
+      <pc:sldMasterChg chg="modSp modSldLayout">
+        <pc:chgData name="Percy Soto Becerra" userId="74d2a9162288af9c" providerId="LiveId" clId="{9E258D4F-9D85-4E22-A43D-FC26D32356DD}" dt="2022-02-13T06:33:36.215" v="48"/>
+        <pc:sldMasterMkLst>
+          <pc:docMk/>
+          <pc:sldMasterMk cId="1901621784" sldId="2147483708"/>
+        </pc:sldMasterMkLst>
+        <pc:spChg chg="mod">
+          <ac:chgData name="Percy Soto Becerra" userId="74d2a9162288af9c" providerId="LiveId" clId="{9E258D4F-9D85-4E22-A43D-FC26D32356DD}" dt="2022-02-13T06:33:36.215" v="48"/>
+          <ac:spMkLst>
+            <pc:docMk/>
+            <pc:sldMasterMk cId="1901621784" sldId="2147483708"/>
+            <ac:spMk id="2" creationId="{00000000-0000-0000-0000-000000000000}"/>
+          </ac:spMkLst>
+        </pc:spChg>
+        <pc:spChg chg="mod">
+          <ac:chgData name="Percy Soto Becerra" userId="74d2a9162288af9c" providerId="LiveId" clId="{9E258D4F-9D85-4E22-A43D-FC26D32356DD}" dt="2022-02-13T06:33:36.215" v="48"/>
+          <ac:spMkLst>
+            <pc:docMk/>
+            <pc:sldMasterMk cId="1901621784" sldId="2147483708"/>
+            <ac:spMk id="3" creationId="{00000000-0000-0000-0000-000000000000}"/>
+          </ac:spMkLst>
+        </pc:spChg>
+        <pc:spChg chg="mod">
+          <ac:chgData name="Percy Soto Becerra" userId="74d2a9162288af9c" providerId="LiveId" clId="{9E258D4F-9D85-4E22-A43D-FC26D32356DD}" dt="2022-02-13T06:33:36.215" v="48"/>
+          <ac:spMkLst>
+            <pc:docMk/>
+            <pc:sldMasterMk cId="1901621784" sldId="2147483708"/>
+            <ac:spMk id="4" creationId="{00000000-0000-0000-0000-000000000000}"/>
+          </ac:spMkLst>
+        </pc:spChg>
+        <pc:spChg chg="mod">
+          <ac:chgData name="Percy Soto Becerra" userId="74d2a9162288af9c" providerId="LiveId" clId="{9E258D4F-9D85-4E22-A43D-FC26D32356DD}" dt="2022-02-13T06:33:36.215" v="48"/>
+          <ac:spMkLst>
+            <pc:docMk/>
+            <pc:sldMasterMk cId="1901621784" sldId="2147483708"/>
+            <ac:spMk id="5" creationId="{00000000-0000-0000-0000-000000000000}"/>
+          </ac:spMkLst>
+        </pc:spChg>
+        <pc:spChg chg="mod">
+          <ac:chgData name="Percy Soto Becerra" userId="74d2a9162288af9c" providerId="LiveId" clId="{9E258D4F-9D85-4E22-A43D-FC26D32356DD}" dt="2022-02-13T06:33:36.215" v="48"/>
+          <ac:spMkLst>
+            <pc:docMk/>
+            <pc:sldMasterMk cId="1901621784" sldId="2147483708"/>
+            <ac:spMk id="6" creationId="{00000000-0000-0000-0000-000000000000}"/>
+          </ac:spMkLst>
+        </pc:spChg>
+        <pc:sldLayoutChg chg="modSp">
+          <pc:chgData name="Percy Soto Becerra" userId="74d2a9162288af9c" providerId="LiveId" clId="{9E258D4F-9D85-4E22-A43D-FC26D32356DD}" dt="2022-02-13T06:33:36.215" v="48"/>
+          <pc:sldLayoutMkLst>
+            <pc:docMk/>
+            <pc:sldMasterMk cId="1901621784" sldId="2147483708"/>
+            <pc:sldLayoutMk cId="2015189026" sldId="2147483709"/>
+          </pc:sldLayoutMkLst>
+          <pc:spChg chg="mod">
+            <ac:chgData name="Percy Soto Becerra" userId="74d2a9162288af9c" providerId="LiveId" clId="{9E258D4F-9D85-4E22-A43D-FC26D32356DD}" dt="2022-02-13T06:33:36.215" v="48"/>
+            <ac:spMkLst>
+              <pc:docMk/>
+              <pc:sldMasterMk cId="1901621784" sldId="2147483708"/>
+              <pc:sldLayoutMk cId="2015189026" sldId="2147483709"/>
+              <ac:spMk id="2" creationId="{00000000-0000-0000-0000-000000000000}"/>
+            </ac:spMkLst>
+          </pc:spChg>
+          <pc:spChg chg="mod">
+            <ac:chgData name="Percy Soto Becerra" userId="74d2a9162288af9c" providerId="LiveId" clId="{9E258D4F-9D85-4E22-A43D-FC26D32356DD}" dt="2022-02-13T06:33:36.215" v="48"/>
+            <ac:spMkLst>
+              <pc:docMk/>
+              <pc:sldMasterMk cId="1901621784" sldId="2147483708"/>
+              <pc:sldLayoutMk cId="2015189026" sldId="2147483709"/>
+              <ac:spMk id="3" creationId="{00000000-0000-0000-0000-000000000000}"/>
+            </ac:spMkLst>
+          </pc:spChg>
+        </pc:sldLayoutChg>
+        <pc:sldLayoutChg chg="modSp">
+          <pc:chgData name="Percy Soto Becerra" userId="74d2a9162288af9c" providerId="LiveId" clId="{9E258D4F-9D85-4E22-A43D-FC26D32356DD}" dt="2022-02-13T06:33:36.215" v="48"/>
+          <pc:sldLayoutMkLst>
+            <pc:docMk/>
+            <pc:sldMasterMk cId="1901621784" sldId="2147483708"/>
+            <pc:sldLayoutMk cId="1471466339" sldId="2147483711"/>
+          </pc:sldLayoutMkLst>
+          <pc:spChg chg="mod">
+            <ac:chgData name="Percy Soto Becerra" userId="74d2a9162288af9c" providerId="LiveId" clId="{9E258D4F-9D85-4E22-A43D-FC26D32356DD}" dt="2022-02-13T06:33:36.215" v="48"/>
+            <ac:spMkLst>
+              <pc:docMk/>
+              <pc:sldMasterMk cId="1901621784" sldId="2147483708"/>
+              <pc:sldLayoutMk cId="1471466339" sldId="2147483711"/>
+              <ac:spMk id="2" creationId="{00000000-0000-0000-0000-000000000000}"/>
+            </ac:spMkLst>
+          </pc:spChg>
+          <pc:spChg chg="mod">
+            <ac:chgData name="Percy Soto Becerra" userId="74d2a9162288af9c" providerId="LiveId" clId="{9E258D4F-9D85-4E22-A43D-FC26D32356DD}" dt="2022-02-13T06:33:36.215" v="48"/>
+            <ac:spMkLst>
+              <pc:docMk/>
+              <pc:sldMasterMk cId="1901621784" sldId="2147483708"/>
+              <pc:sldLayoutMk cId="1471466339" sldId="2147483711"/>
+              <ac:spMk id="3" creationId="{00000000-0000-0000-0000-000000000000}"/>
+            </ac:spMkLst>
+          </pc:spChg>
+        </pc:sldLayoutChg>
+        <pc:sldLayoutChg chg="modSp">
+          <pc:chgData name="Percy Soto Becerra" userId="74d2a9162288af9c" providerId="LiveId" clId="{9E258D4F-9D85-4E22-A43D-FC26D32356DD}" dt="2022-02-13T06:33:36.215" v="48"/>
+          <pc:sldLayoutMkLst>
+            <pc:docMk/>
+            <pc:sldMasterMk cId="1901621784" sldId="2147483708"/>
+            <pc:sldLayoutMk cId="1805250886" sldId="2147483712"/>
+          </pc:sldLayoutMkLst>
+          <pc:spChg chg="mod">
+            <ac:chgData name="Percy Soto Becerra" userId="74d2a9162288af9c" providerId="LiveId" clId="{9E258D4F-9D85-4E22-A43D-FC26D32356DD}" dt="2022-02-13T06:33:36.215" v="48"/>
+            <ac:spMkLst>
+              <pc:docMk/>
+              <pc:sldMasterMk cId="1901621784" sldId="2147483708"/>
+              <pc:sldLayoutMk cId="1805250886" sldId="2147483712"/>
+              <ac:spMk id="3" creationId="{00000000-0000-0000-0000-000000000000}"/>
+            </ac:spMkLst>
+          </pc:spChg>
+          <pc:spChg chg="mod">
+            <ac:chgData name="Percy Soto Becerra" userId="74d2a9162288af9c" providerId="LiveId" clId="{9E258D4F-9D85-4E22-A43D-FC26D32356DD}" dt="2022-02-13T06:33:36.215" v="48"/>
+            <ac:spMkLst>
+              <pc:docMk/>
+              <pc:sldMasterMk cId="1901621784" sldId="2147483708"/>
+              <pc:sldLayoutMk cId="1805250886" sldId="2147483712"/>
+              <ac:spMk id="4" creationId="{00000000-0000-0000-0000-000000000000}"/>
+            </ac:spMkLst>
+          </pc:spChg>
+        </pc:sldLayoutChg>
+        <pc:sldLayoutChg chg="modSp">
+          <pc:chgData name="Percy Soto Becerra" userId="74d2a9162288af9c" providerId="LiveId" clId="{9E258D4F-9D85-4E22-A43D-FC26D32356DD}" dt="2022-02-13T06:33:36.215" v="48"/>
+          <pc:sldLayoutMkLst>
+            <pc:docMk/>
+            <pc:sldMasterMk cId="1901621784" sldId="2147483708"/>
+            <pc:sldLayoutMk cId="2150367333" sldId="2147483713"/>
+          </pc:sldLayoutMkLst>
+          <pc:spChg chg="mod">
+            <ac:chgData name="Percy Soto Becerra" userId="74d2a9162288af9c" providerId="LiveId" clId="{9E258D4F-9D85-4E22-A43D-FC26D32356DD}" dt="2022-02-13T06:33:36.215" v="48"/>
+            <ac:spMkLst>
+              <pc:docMk/>
+              <pc:sldMasterMk cId="1901621784" sldId="2147483708"/>
+              <pc:sldLayoutMk cId="2150367333" sldId="2147483713"/>
+              <ac:spMk id="2" creationId="{00000000-0000-0000-0000-000000000000}"/>
+            </ac:spMkLst>
+          </pc:spChg>
+          <pc:spChg chg="mod">
+            <ac:chgData name="Percy Soto Becerra" userId="74d2a9162288af9c" providerId="LiveId" clId="{9E258D4F-9D85-4E22-A43D-FC26D32356DD}" dt="2022-02-13T06:33:36.215" v="48"/>
+            <ac:spMkLst>
+              <pc:docMk/>
+              <pc:sldMasterMk cId="1901621784" sldId="2147483708"/>
+              <pc:sldLayoutMk cId="2150367333" sldId="2147483713"/>
+              <ac:spMk id="3" creationId="{00000000-0000-0000-0000-000000000000}"/>
+            </ac:spMkLst>
+          </pc:spChg>
+          <pc:spChg chg="mod">
+            <ac:chgData name="Percy Soto Becerra" userId="74d2a9162288af9c" providerId="LiveId" clId="{9E258D4F-9D85-4E22-A43D-FC26D32356DD}" dt="2022-02-13T06:33:36.215" v="48"/>
+            <ac:spMkLst>
+              <pc:docMk/>
+              <pc:sldMasterMk cId="1901621784" sldId="2147483708"/>
+              <pc:sldLayoutMk cId="2150367333" sldId="2147483713"/>
+              <ac:spMk id="4" creationId="{00000000-0000-0000-0000-000000000000}"/>
+            </ac:spMkLst>
+          </pc:spChg>
+          <pc:spChg chg="mod">
+            <ac:chgData name="Percy Soto Becerra" userId="74d2a9162288af9c" providerId="LiveId" clId="{9E258D4F-9D85-4E22-A43D-FC26D32356DD}" dt="2022-02-13T06:33:36.215" v="48"/>
+            <ac:spMkLst>
+              <pc:docMk/>
+              <pc:sldMasterMk cId="1901621784" sldId="2147483708"/>
+              <pc:sldLayoutMk cId="2150367333" sldId="2147483713"/>
+              <ac:spMk id="5" creationId="{00000000-0000-0000-0000-000000000000}"/>
+            </ac:spMkLst>
+          </pc:spChg>
+          <pc:spChg chg="mod">
+            <ac:chgData name="Percy Soto Becerra" userId="74d2a9162288af9c" providerId="LiveId" clId="{9E258D4F-9D85-4E22-A43D-FC26D32356DD}" dt="2022-02-13T06:33:36.215" v="48"/>
+            <ac:spMkLst>
+              <pc:docMk/>
+              <pc:sldMasterMk cId="1901621784" sldId="2147483708"/>
+              <pc:sldLayoutMk cId="2150367333" sldId="2147483713"/>
+              <ac:spMk id="6" creationId="{00000000-0000-0000-0000-000000000000}"/>
+            </ac:spMkLst>
+          </pc:spChg>
+        </pc:sldLayoutChg>
+        <pc:sldLayoutChg chg="modSp">
+          <pc:chgData name="Percy Soto Becerra" userId="74d2a9162288af9c" providerId="LiveId" clId="{9E258D4F-9D85-4E22-A43D-FC26D32356DD}" dt="2022-02-13T06:33:36.215" v="48"/>
+          <pc:sldLayoutMkLst>
+            <pc:docMk/>
+            <pc:sldMasterMk cId="1901621784" sldId="2147483708"/>
+            <pc:sldLayoutMk cId="1194301312" sldId="2147483716"/>
+          </pc:sldLayoutMkLst>
+          <pc:spChg chg="mod">
+            <ac:chgData name="Percy Soto Becerra" userId="74d2a9162288af9c" providerId="LiveId" clId="{9E258D4F-9D85-4E22-A43D-FC26D32356DD}" dt="2022-02-13T06:33:36.215" v="48"/>
+            <ac:spMkLst>
+              <pc:docMk/>
+              <pc:sldMasterMk cId="1901621784" sldId="2147483708"/>
+              <pc:sldLayoutMk cId="1194301312" sldId="2147483716"/>
+              <ac:spMk id="2" creationId="{00000000-0000-0000-0000-000000000000}"/>
+            </ac:spMkLst>
+          </pc:spChg>
+          <pc:spChg chg="mod">
+            <ac:chgData name="Percy Soto Becerra" userId="74d2a9162288af9c" providerId="LiveId" clId="{9E258D4F-9D85-4E22-A43D-FC26D32356DD}" dt="2022-02-13T06:33:36.215" v="48"/>
+            <ac:spMkLst>
+              <pc:docMk/>
+              <pc:sldMasterMk cId="1901621784" sldId="2147483708"/>
+              <pc:sldLayoutMk cId="1194301312" sldId="2147483716"/>
+              <ac:spMk id="3" creationId="{00000000-0000-0000-0000-000000000000}"/>
+            </ac:spMkLst>
+          </pc:spChg>
+          <pc:spChg chg="mod">
+            <ac:chgData name="Percy Soto Becerra" userId="74d2a9162288af9c" providerId="LiveId" clId="{9E258D4F-9D85-4E22-A43D-FC26D32356DD}" dt="2022-02-13T06:33:36.215" v="48"/>
+            <ac:spMkLst>
+              <pc:docMk/>
+              <pc:sldMasterMk cId="1901621784" sldId="2147483708"/>
+              <pc:sldLayoutMk cId="1194301312" sldId="2147483716"/>
+              <ac:spMk id="4" creationId="{00000000-0000-0000-0000-000000000000}"/>
+            </ac:spMkLst>
+          </pc:spChg>
+        </pc:sldLayoutChg>
+        <pc:sldLayoutChg chg="modSp">
+          <pc:chgData name="Percy Soto Becerra" userId="74d2a9162288af9c" providerId="LiveId" clId="{9E258D4F-9D85-4E22-A43D-FC26D32356DD}" dt="2022-02-13T06:33:36.215" v="48"/>
+          <pc:sldLayoutMkLst>
+            <pc:docMk/>
+            <pc:sldMasterMk cId="1901621784" sldId="2147483708"/>
+            <pc:sldLayoutMk cId="2741132086" sldId="2147483717"/>
+          </pc:sldLayoutMkLst>
+          <pc:spChg chg="mod">
+            <ac:chgData name="Percy Soto Becerra" userId="74d2a9162288af9c" providerId="LiveId" clId="{9E258D4F-9D85-4E22-A43D-FC26D32356DD}" dt="2022-02-13T06:33:36.215" v="48"/>
+            <ac:spMkLst>
+              <pc:docMk/>
+              <pc:sldMasterMk cId="1901621784" sldId="2147483708"/>
+              <pc:sldLayoutMk cId="2741132086" sldId="2147483717"/>
+              <ac:spMk id="2" creationId="{00000000-0000-0000-0000-000000000000}"/>
+            </ac:spMkLst>
+          </pc:spChg>
+          <pc:spChg chg="mod">
+            <ac:chgData name="Percy Soto Becerra" userId="74d2a9162288af9c" providerId="LiveId" clId="{9E258D4F-9D85-4E22-A43D-FC26D32356DD}" dt="2022-02-13T06:33:36.215" v="48"/>
+            <ac:spMkLst>
+              <pc:docMk/>
+              <pc:sldMasterMk cId="1901621784" sldId="2147483708"/>
+              <pc:sldLayoutMk cId="2741132086" sldId="2147483717"/>
+              <ac:spMk id="3" creationId="{00000000-0000-0000-0000-000000000000}"/>
+            </ac:spMkLst>
+          </pc:spChg>
+          <pc:spChg chg="mod">
+            <ac:chgData name="Percy Soto Becerra" userId="74d2a9162288af9c" providerId="LiveId" clId="{9E258D4F-9D85-4E22-A43D-FC26D32356DD}" dt="2022-02-13T06:33:36.215" v="48"/>
+            <ac:spMkLst>
+              <pc:docMk/>
+              <pc:sldMasterMk cId="1901621784" sldId="2147483708"/>
+              <pc:sldLayoutMk cId="2741132086" sldId="2147483717"/>
+              <ac:spMk id="4" creationId="{00000000-0000-0000-0000-000000000000}"/>
+            </ac:spMkLst>
+          </pc:spChg>
+        </pc:sldLayoutChg>
+        <pc:sldLayoutChg chg="modSp">
+          <pc:chgData name="Percy Soto Becerra" userId="74d2a9162288af9c" providerId="LiveId" clId="{9E258D4F-9D85-4E22-A43D-FC26D32356DD}" dt="2022-02-13T06:33:36.215" v="48"/>
+          <pc:sldLayoutMkLst>
+            <pc:docMk/>
+            <pc:sldMasterMk cId="1901621784" sldId="2147483708"/>
+            <pc:sldLayoutMk cId="2015861376" sldId="2147483719"/>
+          </pc:sldLayoutMkLst>
+          <pc:spChg chg="mod">
+            <ac:chgData name="Percy Soto Becerra" userId="74d2a9162288af9c" providerId="LiveId" clId="{9E258D4F-9D85-4E22-A43D-FC26D32356DD}" dt="2022-02-13T06:33:36.215" v="48"/>
+            <ac:spMkLst>
+              <pc:docMk/>
+              <pc:sldMasterMk cId="1901621784" sldId="2147483708"/>
+              <pc:sldLayoutMk cId="2015861376" sldId="2147483719"/>
+              <ac:spMk id="2" creationId="{00000000-0000-0000-0000-000000000000}"/>
+            </ac:spMkLst>
+          </pc:spChg>
+          <pc:spChg chg="mod">
+            <ac:chgData name="Percy Soto Becerra" userId="74d2a9162288af9c" providerId="LiveId" clId="{9E258D4F-9D85-4E22-A43D-FC26D32356DD}" dt="2022-02-13T06:33:36.215" v="48"/>
+            <ac:spMkLst>
+              <pc:docMk/>
+              <pc:sldMasterMk cId="1901621784" sldId="2147483708"/>
+              <pc:sldLayoutMk cId="2015861376" sldId="2147483719"/>
+              <ac:spMk id="3" creationId="{00000000-0000-0000-0000-000000000000}"/>
+            </ac:spMkLst>
+          </pc:spChg>
+        </pc:sldLayoutChg>
+      </pc:sldMasterChg>
+      <pc:sldMasterChg chg="modSp modSldLayout">
+        <pc:chgData name="Percy Soto Becerra" userId="74d2a9162288af9c" providerId="LiveId" clId="{9E258D4F-9D85-4E22-A43D-FC26D32356DD}" dt="2022-02-13T06:33:36.033" v="47"/>
+        <pc:sldMasterMkLst>
+          <pc:docMk/>
+          <pc:sldMasterMk cId="4040779335" sldId="2147483720"/>
+        </pc:sldMasterMkLst>
+        <pc:spChg chg="mod">
+          <ac:chgData name="Percy Soto Becerra" userId="74d2a9162288af9c" providerId="LiveId" clId="{9E258D4F-9D85-4E22-A43D-FC26D32356DD}" dt="2022-02-13T06:33:36.033" v="47"/>
+          <ac:spMkLst>
+            <pc:docMk/>
+            <pc:sldMasterMk cId="4040779335" sldId="2147483720"/>
+            <ac:spMk id="2" creationId="{00000000-0000-0000-0000-000000000000}"/>
+          </ac:spMkLst>
+        </pc:spChg>
+        <pc:spChg chg="mod">
+          <ac:chgData name="Percy Soto Becerra" userId="74d2a9162288af9c" providerId="LiveId" clId="{9E258D4F-9D85-4E22-A43D-FC26D32356DD}" dt="2022-02-13T06:33:36.033" v="47"/>
+          <ac:spMkLst>
+            <pc:docMk/>
+            <pc:sldMasterMk cId="4040779335" sldId="2147483720"/>
+            <ac:spMk id="3" creationId="{00000000-0000-0000-0000-000000000000}"/>
+          </ac:spMkLst>
+        </pc:spChg>
+        <pc:spChg chg="mod">
+          <ac:chgData name="Percy Soto Becerra" userId="74d2a9162288af9c" providerId="LiveId" clId="{9E258D4F-9D85-4E22-A43D-FC26D32356DD}" dt="2022-02-13T06:33:36.033" v="47"/>
+          <ac:spMkLst>
+            <pc:docMk/>
+            <pc:sldMasterMk cId="4040779335" sldId="2147483720"/>
+            <ac:spMk id="4" creationId="{00000000-0000-0000-0000-000000000000}"/>
+          </ac:spMkLst>
+        </pc:spChg>
+        <pc:spChg chg="mod">
+          <ac:chgData name="Percy Soto Becerra" userId="74d2a9162288af9c" providerId="LiveId" clId="{9E258D4F-9D85-4E22-A43D-FC26D32356DD}" dt="2022-02-13T06:33:36.033" v="47"/>
+          <ac:spMkLst>
+            <pc:docMk/>
+            <pc:sldMasterMk cId="4040779335" sldId="2147483720"/>
+            <ac:spMk id="5" creationId="{00000000-0000-0000-0000-000000000000}"/>
+          </ac:spMkLst>
+        </pc:spChg>
+        <pc:spChg chg="mod">
+          <ac:chgData name="Percy Soto Becerra" userId="74d2a9162288af9c" providerId="LiveId" clId="{9E258D4F-9D85-4E22-A43D-FC26D32356DD}" dt="2022-02-13T06:33:36.033" v="47"/>
+          <ac:spMkLst>
+            <pc:docMk/>
+            <pc:sldMasterMk cId="4040779335" sldId="2147483720"/>
+            <ac:spMk id="6" creationId="{00000000-0000-0000-0000-000000000000}"/>
+          </ac:spMkLst>
+        </pc:spChg>
+        <pc:sldLayoutChg chg="modSp">
+          <pc:chgData name="Percy Soto Becerra" userId="74d2a9162288af9c" providerId="LiveId" clId="{9E258D4F-9D85-4E22-A43D-FC26D32356DD}" dt="2022-02-13T06:33:36.033" v="47"/>
+          <pc:sldLayoutMkLst>
+            <pc:docMk/>
+            <pc:sldMasterMk cId="4040779335" sldId="2147483720"/>
+            <pc:sldLayoutMk cId="4018533533" sldId="2147483721"/>
+          </pc:sldLayoutMkLst>
+          <pc:spChg chg="mod">
+            <ac:chgData name="Percy Soto Becerra" userId="74d2a9162288af9c" providerId="LiveId" clId="{9E258D4F-9D85-4E22-A43D-FC26D32356DD}" dt="2022-02-13T06:33:36.033" v="47"/>
+            <ac:spMkLst>
+              <pc:docMk/>
+              <pc:sldMasterMk cId="4040779335" sldId="2147483720"/>
+              <pc:sldLayoutMk cId="4018533533" sldId="2147483721"/>
+              <ac:spMk id="2" creationId="{00000000-0000-0000-0000-000000000000}"/>
+            </ac:spMkLst>
+          </pc:spChg>
+          <pc:spChg chg="mod">
+            <ac:chgData name="Percy Soto Becerra" userId="74d2a9162288af9c" providerId="LiveId" clId="{9E258D4F-9D85-4E22-A43D-FC26D32356DD}" dt="2022-02-13T06:33:36.033" v="47"/>
+            <ac:spMkLst>
+              <pc:docMk/>
+              <pc:sldMasterMk cId="4040779335" sldId="2147483720"/>
+              <pc:sldLayoutMk cId="4018533533" sldId="2147483721"/>
+              <ac:spMk id="3" creationId="{00000000-0000-0000-0000-000000000000}"/>
+            </ac:spMkLst>
+          </pc:spChg>
+        </pc:sldLayoutChg>
+        <pc:sldLayoutChg chg="modSp">
+          <pc:chgData name="Percy Soto Becerra" userId="74d2a9162288af9c" providerId="LiveId" clId="{9E258D4F-9D85-4E22-A43D-FC26D32356DD}" dt="2022-02-13T06:33:36.033" v="47"/>
+          <pc:sldLayoutMkLst>
+            <pc:docMk/>
+            <pc:sldMasterMk cId="4040779335" sldId="2147483720"/>
+            <pc:sldLayoutMk cId="1000576850" sldId="2147483723"/>
+          </pc:sldLayoutMkLst>
+          <pc:spChg chg="mod">
+            <ac:chgData name="Percy Soto Becerra" userId="74d2a9162288af9c" providerId="LiveId" clId="{9E258D4F-9D85-4E22-A43D-FC26D32356DD}" dt="2022-02-13T06:33:36.033" v="47"/>
+            <ac:spMkLst>
+              <pc:docMk/>
+              <pc:sldMasterMk cId="4040779335" sldId="2147483720"/>
+              <pc:sldLayoutMk cId="1000576850" sldId="2147483723"/>
+              <ac:spMk id="2" creationId="{00000000-0000-0000-0000-000000000000}"/>
+            </ac:spMkLst>
+          </pc:spChg>
+          <pc:spChg chg="mod">
+            <ac:chgData name="Percy Soto Becerra" userId="74d2a9162288af9c" providerId="LiveId" clId="{9E258D4F-9D85-4E22-A43D-FC26D32356DD}" dt="2022-02-13T06:33:36.033" v="47"/>
+            <ac:spMkLst>
+              <pc:docMk/>
+              <pc:sldMasterMk cId="4040779335" sldId="2147483720"/>
+              <pc:sldLayoutMk cId="1000576850" sldId="2147483723"/>
+              <ac:spMk id="3" creationId="{00000000-0000-0000-0000-000000000000}"/>
+            </ac:spMkLst>
+          </pc:spChg>
+        </pc:sldLayoutChg>
+        <pc:sldLayoutChg chg="modSp">
+          <pc:chgData name="Percy Soto Becerra" userId="74d2a9162288af9c" providerId="LiveId" clId="{9E258D4F-9D85-4E22-A43D-FC26D32356DD}" dt="2022-02-13T06:33:36.033" v="47"/>
+          <pc:sldLayoutMkLst>
+            <pc:docMk/>
+            <pc:sldMasterMk cId="4040779335" sldId="2147483720"/>
+            <pc:sldLayoutMk cId="2846383548" sldId="2147483724"/>
+          </pc:sldLayoutMkLst>
+          <pc:spChg chg="mod">
+            <ac:chgData name="Percy Soto Becerra" userId="74d2a9162288af9c" providerId="LiveId" clId="{9E258D4F-9D85-4E22-A43D-FC26D32356DD}" dt="2022-02-13T06:33:36.033" v="47"/>
+            <ac:spMkLst>
+              <pc:docMk/>
+              <pc:sldMasterMk cId="4040779335" sldId="2147483720"/>
+              <pc:sldLayoutMk cId="2846383548" sldId="2147483724"/>
+              <ac:spMk id="3" creationId="{00000000-0000-0000-0000-000000000000}"/>
+            </ac:spMkLst>
+          </pc:spChg>
+          <pc:spChg chg="mod">
+            <ac:chgData name="Percy Soto Becerra" userId="74d2a9162288af9c" providerId="LiveId" clId="{9E258D4F-9D85-4E22-A43D-FC26D32356DD}" dt="2022-02-13T06:33:36.033" v="47"/>
+            <ac:spMkLst>
+              <pc:docMk/>
+              <pc:sldMasterMk cId="4040779335" sldId="2147483720"/>
+              <pc:sldLayoutMk cId="2846383548" sldId="2147483724"/>
+              <ac:spMk id="4" creationId="{00000000-0000-0000-0000-000000000000}"/>
+            </ac:spMkLst>
+          </pc:spChg>
+        </pc:sldLayoutChg>
+        <pc:sldLayoutChg chg="modSp">
+          <pc:chgData name="Percy Soto Becerra" userId="74d2a9162288af9c" providerId="LiveId" clId="{9E258D4F-9D85-4E22-A43D-FC26D32356DD}" dt="2022-02-13T06:33:36.033" v="47"/>
+          <pc:sldLayoutMkLst>
+            <pc:docMk/>
+            <pc:sldMasterMk cId="4040779335" sldId="2147483720"/>
+            <pc:sldLayoutMk cId="2983564487" sldId="2147483725"/>
+          </pc:sldLayoutMkLst>
+          <pc:spChg chg="mod">
+            <ac:chgData name="Percy Soto Becerra" userId="74d2a9162288af9c" providerId="LiveId" clId="{9E258D4F-9D85-4E22-A43D-FC26D32356DD}" dt="2022-02-13T06:33:36.033" v="47"/>
+            <ac:spMkLst>
+              <pc:docMk/>
+              <pc:sldMasterMk cId="4040779335" sldId="2147483720"/>
+              <pc:sldLayoutMk cId="2983564487" sldId="2147483725"/>
+              <ac:spMk id="2" creationId="{00000000-0000-0000-0000-000000000000}"/>
+            </ac:spMkLst>
+          </pc:spChg>
+          <pc:spChg chg="mod">
+            <ac:chgData name="Percy Soto Becerra" userId="74d2a9162288af9c" providerId="LiveId" clId="{9E258D4F-9D85-4E22-A43D-FC26D32356DD}" dt="2022-02-13T06:33:36.033" v="47"/>
+            <ac:spMkLst>
+              <pc:docMk/>
+              <pc:sldMasterMk cId="4040779335" sldId="2147483720"/>
+              <pc:sldLayoutMk cId="2983564487" sldId="2147483725"/>
+              <ac:spMk id="3" creationId="{00000000-0000-0000-0000-000000000000}"/>
+            </ac:spMkLst>
+          </pc:spChg>
+          <pc:spChg chg="mod">
+            <ac:chgData name="Percy Soto Becerra" userId="74d2a9162288af9c" providerId="LiveId" clId="{9E258D4F-9D85-4E22-A43D-FC26D32356DD}" dt="2022-02-13T06:33:36.033" v="47"/>
+            <ac:spMkLst>
+              <pc:docMk/>
+              <pc:sldMasterMk cId="4040779335" sldId="2147483720"/>
+              <pc:sldLayoutMk cId="2983564487" sldId="2147483725"/>
+              <ac:spMk id="4" creationId="{00000000-0000-0000-0000-000000000000}"/>
+            </ac:spMkLst>
+          </pc:spChg>
+          <pc:spChg chg="mod">
+            <ac:chgData name="Percy Soto Becerra" userId="74d2a9162288af9c" providerId="LiveId" clId="{9E258D4F-9D85-4E22-A43D-FC26D32356DD}" dt="2022-02-13T06:33:36.033" v="47"/>
+            <ac:spMkLst>
+              <pc:docMk/>
+              <pc:sldMasterMk cId="4040779335" sldId="2147483720"/>
+              <pc:sldLayoutMk cId="2983564487" sldId="2147483725"/>
+              <ac:spMk id="5" creationId="{00000000-0000-0000-0000-000000000000}"/>
+            </ac:spMkLst>
+          </pc:spChg>
+          <pc:spChg chg="mod">
+            <ac:chgData name="Percy Soto Becerra" userId="74d2a9162288af9c" providerId="LiveId" clId="{9E258D4F-9D85-4E22-A43D-FC26D32356DD}" dt="2022-02-13T06:33:36.033" v="47"/>
+            <ac:spMkLst>
+              <pc:docMk/>
+              <pc:sldMasterMk cId="4040779335" sldId="2147483720"/>
+              <pc:sldLayoutMk cId="2983564487" sldId="2147483725"/>
+              <ac:spMk id="6" creationId="{00000000-0000-0000-0000-000000000000}"/>
+            </ac:spMkLst>
+          </pc:spChg>
+        </pc:sldLayoutChg>
+        <pc:sldLayoutChg chg="modSp">
+          <pc:chgData name="Percy Soto Becerra" userId="74d2a9162288af9c" providerId="LiveId" clId="{9E258D4F-9D85-4E22-A43D-FC26D32356DD}" dt="2022-02-13T06:33:36.033" v="47"/>
+          <pc:sldLayoutMkLst>
+            <pc:docMk/>
+            <pc:sldMasterMk cId="4040779335" sldId="2147483720"/>
+            <pc:sldLayoutMk cId="3294224951" sldId="2147483728"/>
+          </pc:sldLayoutMkLst>
+          <pc:spChg chg="mod">
+            <ac:chgData name="Percy Soto Becerra" userId="74d2a9162288af9c" providerId="LiveId" clId="{9E258D4F-9D85-4E22-A43D-FC26D32356DD}" dt="2022-02-13T06:33:36.033" v="47"/>
+            <ac:spMkLst>
+              <pc:docMk/>
+              <pc:sldMasterMk cId="4040779335" sldId="2147483720"/>
+              <pc:sldLayoutMk cId="3294224951" sldId="2147483728"/>
+              <ac:spMk id="2" creationId="{00000000-0000-0000-0000-000000000000}"/>
+            </ac:spMkLst>
+          </pc:spChg>
+          <pc:spChg chg="mod">
+            <ac:chgData name="Percy Soto Becerra" userId="74d2a9162288af9c" providerId="LiveId" clId="{9E258D4F-9D85-4E22-A43D-FC26D32356DD}" dt="2022-02-13T06:33:36.033" v="47"/>
+            <ac:spMkLst>
+              <pc:docMk/>
+              <pc:sldMasterMk cId="4040779335" sldId="2147483720"/>
+              <pc:sldLayoutMk cId="3294224951" sldId="2147483728"/>
+              <ac:spMk id="3" creationId="{00000000-0000-0000-0000-000000000000}"/>
+            </ac:spMkLst>
+          </pc:spChg>
+          <pc:spChg chg="mod">
+            <ac:chgData name="Percy Soto Becerra" userId="74d2a9162288af9c" providerId="LiveId" clId="{9E258D4F-9D85-4E22-A43D-FC26D32356DD}" dt="2022-02-13T06:33:36.033" v="47"/>
+            <ac:spMkLst>
+              <pc:docMk/>
+              <pc:sldMasterMk cId="4040779335" sldId="2147483720"/>
+              <pc:sldLayoutMk cId="3294224951" sldId="2147483728"/>
+              <ac:spMk id="4" creationId="{00000000-0000-0000-0000-000000000000}"/>
+            </ac:spMkLst>
+          </pc:spChg>
+        </pc:sldLayoutChg>
+        <pc:sldLayoutChg chg="modSp">
+          <pc:chgData name="Percy Soto Becerra" userId="74d2a9162288af9c" providerId="LiveId" clId="{9E258D4F-9D85-4E22-A43D-FC26D32356DD}" dt="2022-02-13T06:33:36.033" v="47"/>
+          <pc:sldLayoutMkLst>
+            <pc:docMk/>
+            <pc:sldMasterMk cId="4040779335" sldId="2147483720"/>
+            <pc:sldLayoutMk cId="1226018051" sldId="2147483729"/>
+          </pc:sldLayoutMkLst>
+          <pc:spChg chg="mod">
+            <ac:chgData name="Percy Soto Becerra" userId="74d2a9162288af9c" providerId="LiveId" clId="{9E258D4F-9D85-4E22-A43D-FC26D32356DD}" dt="2022-02-13T06:33:36.033" v="47"/>
+            <ac:spMkLst>
+              <pc:docMk/>
+              <pc:sldMasterMk cId="4040779335" sldId="2147483720"/>
+              <pc:sldLayoutMk cId="1226018051" sldId="2147483729"/>
+              <ac:spMk id="2" creationId="{00000000-0000-0000-0000-000000000000}"/>
+            </ac:spMkLst>
+          </pc:spChg>
+          <pc:spChg chg="mod">
+            <ac:chgData name="Percy Soto Becerra" userId="74d2a9162288af9c" providerId="LiveId" clId="{9E258D4F-9D85-4E22-A43D-FC26D32356DD}" dt="2022-02-13T06:33:36.033" v="47"/>
+            <ac:spMkLst>
+              <pc:docMk/>
+              <pc:sldMasterMk cId="4040779335" sldId="2147483720"/>
+              <pc:sldLayoutMk cId="1226018051" sldId="2147483729"/>
+              <ac:spMk id="3" creationId="{00000000-0000-0000-0000-000000000000}"/>
+            </ac:spMkLst>
+          </pc:spChg>
+          <pc:spChg chg="mod">
+            <ac:chgData name="Percy Soto Becerra" userId="74d2a9162288af9c" providerId="LiveId" clId="{9E258D4F-9D85-4E22-A43D-FC26D32356DD}" dt="2022-02-13T06:33:36.033" v="47"/>
+            <ac:spMkLst>
+              <pc:docMk/>
+              <pc:sldMasterMk cId="4040779335" sldId="2147483720"/>
+              <pc:sldLayoutMk cId="1226018051" sldId="2147483729"/>
+              <ac:spMk id="4" creationId="{00000000-0000-0000-0000-000000000000}"/>
+            </ac:spMkLst>
+          </pc:spChg>
+        </pc:sldLayoutChg>
+        <pc:sldLayoutChg chg="modSp">
+          <pc:chgData name="Percy Soto Becerra" userId="74d2a9162288af9c" providerId="LiveId" clId="{9E258D4F-9D85-4E22-A43D-FC26D32356DD}" dt="2022-02-13T06:33:36.033" v="47"/>
+          <pc:sldLayoutMkLst>
+            <pc:docMk/>
+            <pc:sldMasterMk cId="4040779335" sldId="2147483720"/>
+            <pc:sldLayoutMk cId="4015391866" sldId="2147483731"/>
+          </pc:sldLayoutMkLst>
+          <pc:spChg chg="mod">
+            <ac:chgData name="Percy Soto Becerra" userId="74d2a9162288af9c" providerId="LiveId" clId="{9E258D4F-9D85-4E22-A43D-FC26D32356DD}" dt="2022-02-13T06:33:36.033" v="47"/>
+            <ac:spMkLst>
+              <pc:docMk/>
+              <pc:sldMasterMk cId="4040779335" sldId="2147483720"/>
+              <pc:sldLayoutMk cId="4015391866" sldId="2147483731"/>
+              <ac:spMk id="2" creationId="{00000000-0000-0000-0000-000000000000}"/>
+            </ac:spMkLst>
+          </pc:spChg>
+          <pc:spChg chg="mod">
+            <ac:chgData name="Percy Soto Becerra" userId="74d2a9162288af9c" providerId="LiveId" clId="{9E258D4F-9D85-4E22-A43D-FC26D32356DD}" dt="2022-02-13T06:33:36.033" v="47"/>
+            <ac:spMkLst>
+              <pc:docMk/>
+              <pc:sldMasterMk cId="4040779335" sldId="2147483720"/>
+              <pc:sldLayoutMk cId="4015391866" sldId="2147483731"/>
               <ac:spMk id="3" creationId="{00000000-0000-0000-0000-000000000000}"/>
             </ac:spMkLst>
           </pc:spChg>
@@ -1285,15 +2112,15 @@
         </p:nvSpPr>
         <p:spPr>
           <a:xfrm>
-            <a:off x="1524006" y="412572"/>
-            <a:ext cx="9144000" cy="877664"/>
+            <a:off x="1524000" y="530524"/>
+            <a:ext cx="9144000" cy="1128583"/>
           </a:xfrm>
         </p:spPr>
         <p:txBody>
           <a:bodyPr anchor="b"/>
           <a:lstStyle>
             <a:lvl1pPr algn="ctr">
-              <a:defRPr sz="2206"/>
+              <a:defRPr sz="2836"/>
             </a:lvl1pPr>
           </a:lstStyle>
           <a:p>
@@ -1317,8 +2144,8 @@
         </p:nvSpPr>
         <p:spPr>
           <a:xfrm>
-            <a:off x="1524006" y="1324082"/>
-            <a:ext cx="9144000" cy="608646"/>
+            <a:off x="1524000" y="1702630"/>
+            <a:ext cx="9144000" cy="782654"/>
           </a:xfrm>
         </p:spPr>
         <p:txBody>
@@ -1326,39 +2153,39 @@
           <a:lstStyle>
             <a:lvl1pPr marL="0" indent="0" algn="ctr">
               <a:buNone/>
-              <a:defRPr sz="880"/>
+              <a:defRPr sz="1134"/>
             </a:lvl1pPr>
-            <a:lvl2pPr marL="168051" indent="0" algn="ctr">
-              <a:buNone/>
-              <a:defRPr sz="734"/>
+            <a:lvl2pPr marL="216118" indent="0" algn="ctr">
+              <a:buNone/>
+              <a:defRPr sz="945"/>
             </a:lvl2pPr>
-            <a:lvl3pPr marL="336108" indent="0" algn="ctr">
-              <a:buNone/>
-              <a:defRPr sz="660"/>
+            <a:lvl3pPr marL="432237" indent="0" algn="ctr">
+              <a:buNone/>
+              <a:defRPr sz="851"/>
             </a:lvl3pPr>
-            <a:lvl4pPr marL="504159" indent="0" algn="ctr">
-              <a:buNone/>
-              <a:defRPr sz="587"/>
+            <a:lvl4pPr marL="648355" indent="0" algn="ctr">
+              <a:buNone/>
+              <a:defRPr sz="756"/>
             </a:lvl4pPr>
-            <a:lvl5pPr marL="672216" indent="0" algn="ctr">
-              <a:buNone/>
-              <a:defRPr sz="587"/>
+            <a:lvl5pPr marL="864474" indent="0" algn="ctr">
+              <a:buNone/>
+              <a:defRPr sz="756"/>
             </a:lvl5pPr>
-            <a:lvl6pPr marL="840267" indent="0" algn="ctr">
-              <a:buNone/>
-              <a:defRPr sz="587"/>
+            <a:lvl6pPr marL="1080592" indent="0" algn="ctr">
+              <a:buNone/>
+              <a:defRPr sz="756"/>
             </a:lvl6pPr>
-            <a:lvl7pPr marL="1008319" indent="0" algn="ctr">
-              <a:buNone/>
-              <a:defRPr sz="587"/>
+            <a:lvl7pPr marL="1296711" indent="0" algn="ctr">
+              <a:buNone/>
+              <a:defRPr sz="756"/>
             </a:lvl7pPr>
-            <a:lvl8pPr marL="1176375" indent="0" algn="ctr">
-              <a:buNone/>
-              <a:defRPr sz="587"/>
+            <a:lvl8pPr marL="1512829" indent="0" algn="ctr">
+              <a:buNone/>
+              <a:defRPr sz="756"/>
             </a:lvl8pPr>
-            <a:lvl9pPr marL="1344427" indent="0" algn="ctr">
-              <a:buNone/>
-              <a:defRPr sz="587"/>
+            <a:lvl9pPr marL="1728948" indent="0" algn="ctr">
+              <a:buNone/>
+              <a:defRPr sz="756"/>
             </a:lvl9pPr>
           </a:lstStyle>
           <a:p>
@@ -1387,7 +2214,7 @@
           <a:p>
             <a:fld id="{CBEA2793-0B76-4EEE-B377-3F0EDC9ABF2D}" type="datetimeFigureOut">
               <a:rPr lang="es-MX" smtClean="0"/>
-              <a:t>12/02/2022</a:t>
+              <a:t>13/02/2022</a:t>
             </a:fld>
             <a:endParaRPr lang="es-MX"/>
           </a:p>
@@ -1438,7 +2265,7 @@
     </p:spTree>
     <p:extLst>
       <p:ext uri="{BB962C8B-B14F-4D97-AF65-F5344CB8AC3E}">
-        <p14:creationId xmlns:p14="http://schemas.microsoft.com/office/powerpoint/2010/main" val="2460793997"/>
+        <p14:creationId xmlns:p14="http://schemas.microsoft.com/office/powerpoint/2010/main" val="2345581298"/>
       </p:ext>
     </p:extLst>
   </p:cSld>
@@ -1557,7 +2384,7 @@
           <a:p>
             <a:fld id="{CBEA2793-0B76-4EEE-B377-3F0EDC9ABF2D}" type="datetimeFigureOut">
               <a:rPr lang="es-MX" smtClean="0"/>
-              <a:t>12/02/2022</a:t>
+              <a:t>13/02/2022</a:t>
             </a:fld>
             <a:endParaRPr lang="es-MX"/>
           </a:p>
@@ -1608,7 +2435,7 @@
     </p:spTree>
     <p:extLst>
       <p:ext uri="{BB962C8B-B14F-4D97-AF65-F5344CB8AC3E}">
-        <p14:creationId xmlns:p14="http://schemas.microsoft.com/office/powerpoint/2010/main" val="2180580611"/>
+        <p14:creationId xmlns:p14="http://schemas.microsoft.com/office/powerpoint/2010/main" val="2904273606"/>
       </p:ext>
     </p:extLst>
   </p:cSld>
@@ -1647,8 +2474,8 @@
         </p:nvSpPr>
         <p:spPr>
           <a:xfrm>
-            <a:off x="8724904" y="134219"/>
-            <a:ext cx="2628901" cy="2136389"/>
+            <a:off x="8724900" y="172589"/>
+            <a:ext cx="2628900" cy="2747170"/>
           </a:xfrm>
         </p:spPr>
         <p:txBody>
@@ -1675,8 +2502,8 @@
         </p:nvSpPr>
         <p:spPr>
           <a:xfrm>
-            <a:off x="838200" y="134219"/>
-            <a:ext cx="7734300" cy="2136389"/>
+            <a:off x="838200" y="172589"/>
+            <a:ext cx="7734300" cy="2747170"/>
           </a:xfrm>
         </p:spPr>
         <p:txBody>
@@ -1737,7 +2564,7 @@
           <a:p>
             <a:fld id="{CBEA2793-0B76-4EEE-B377-3F0EDC9ABF2D}" type="datetimeFigureOut">
               <a:rPr lang="es-MX" smtClean="0"/>
-              <a:t>12/02/2022</a:t>
+              <a:t>13/02/2022</a:t>
             </a:fld>
             <a:endParaRPr lang="es-MX"/>
           </a:p>
@@ -1788,7 +2615,7 @@
     </p:spTree>
     <p:extLst>
       <p:ext uri="{BB962C8B-B14F-4D97-AF65-F5344CB8AC3E}">
-        <p14:creationId xmlns:p14="http://schemas.microsoft.com/office/powerpoint/2010/main" val="3743415676"/>
+        <p14:creationId xmlns:p14="http://schemas.microsoft.com/office/powerpoint/2010/main" val="1992044249"/>
       </p:ext>
     </p:extLst>
   </p:cSld>
@@ -1907,7 +2734,7 @@
           <a:p>
             <a:fld id="{CBEA2793-0B76-4EEE-B377-3F0EDC9ABF2D}" type="datetimeFigureOut">
               <a:rPr lang="es-MX" smtClean="0"/>
-              <a:t>12/02/2022</a:t>
+              <a:t>13/02/2022</a:t>
             </a:fld>
             <a:endParaRPr lang="es-MX"/>
           </a:p>
@@ -1958,7 +2785,7 @@
     </p:spTree>
     <p:extLst>
       <p:ext uri="{BB962C8B-B14F-4D97-AF65-F5344CB8AC3E}">
-        <p14:creationId xmlns:p14="http://schemas.microsoft.com/office/powerpoint/2010/main" val="3805812937"/>
+        <p14:creationId xmlns:p14="http://schemas.microsoft.com/office/powerpoint/2010/main" val="3252561801"/>
       </p:ext>
     </p:extLst>
   </p:cSld>
@@ -1997,15 +2824,15 @@
         </p:nvSpPr>
         <p:spPr>
           <a:xfrm>
-            <a:off x="831852" y="628489"/>
-            <a:ext cx="10515599" cy="1048645"/>
+            <a:off x="831850" y="808168"/>
+            <a:ext cx="10515600" cy="1348447"/>
           </a:xfrm>
         </p:spPr>
         <p:txBody>
           <a:bodyPr anchor="b"/>
           <a:lstStyle>
             <a:lvl1pPr>
-              <a:defRPr sz="2206"/>
+              <a:defRPr sz="2836"/>
             </a:lvl1pPr>
           </a:lstStyle>
           <a:p>
@@ -2029,8 +2856,8 @@
         </p:nvSpPr>
         <p:spPr>
           <a:xfrm>
-            <a:off x="831852" y="1687053"/>
-            <a:ext cx="10515599" cy="551458"/>
+            <a:off x="831850" y="2169371"/>
+            <a:ext cx="10515600" cy="709116"/>
           </a:xfrm>
         </p:spPr>
         <p:txBody>
@@ -2038,7 +2865,7 @@
           <a:lstStyle>
             <a:lvl1pPr marL="0" indent="0">
               <a:buNone/>
-              <a:defRPr sz="880">
+              <a:defRPr sz="1134">
                 <a:solidFill>
                   <a:schemeClr val="tx1">
                     <a:tint val="75000"/>
@@ -2046,9 +2873,9 @@
                 </a:solidFill>
               </a:defRPr>
             </a:lvl1pPr>
-            <a:lvl2pPr marL="168051" indent="0">
-              <a:buNone/>
-              <a:defRPr sz="734">
+            <a:lvl2pPr marL="216118" indent="0">
+              <a:buNone/>
+              <a:defRPr sz="945">
                 <a:solidFill>
                   <a:schemeClr val="tx1">
                     <a:tint val="75000"/>
@@ -2056,9 +2883,9 @@
                 </a:solidFill>
               </a:defRPr>
             </a:lvl2pPr>
-            <a:lvl3pPr marL="336108" indent="0">
-              <a:buNone/>
-              <a:defRPr sz="660">
+            <a:lvl3pPr marL="432237" indent="0">
+              <a:buNone/>
+              <a:defRPr sz="851">
                 <a:solidFill>
                   <a:schemeClr val="tx1">
                     <a:tint val="75000"/>
@@ -2066,9 +2893,9 @@
                 </a:solidFill>
               </a:defRPr>
             </a:lvl3pPr>
-            <a:lvl4pPr marL="504159" indent="0">
-              <a:buNone/>
-              <a:defRPr sz="587">
+            <a:lvl4pPr marL="648355" indent="0">
+              <a:buNone/>
+              <a:defRPr sz="756">
                 <a:solidFill>
                   <a:schemeClr val="tx1">
                     <a:tint val="75000"/>
@@ -2076,9 +2903,9 @@
                 </a:solidFill>
               </a:defRPr>
             </a:lvl4pPr>
-            <a:lvl5pPr marL="672216" indent="0">
-              <a:buNone/>
-              <a:defRPr sz="587">
+            <a:lvl5pPr marL="864474" indent="0">
+              <a:buNone/>
+              <a:defRPr sz="756">
                 <a:solidFill>
                   <a:schemeClr val="tx1">
                     <a:tint val="75000"/>
@@ -2086,9 +2913,9 @@
                 </a:solidFill>
               </a:defRPr>
             </a:lvl5pPr>
-            <a:lvl6pPr marL="840267" indent="0">
-              <a:buNone/>
-              <a:defRPr sz="587">
+            <a:lvl6pPr marL="1080592" indent="0">
+              <a:buNone/>
+              <a:defRPr sz="756">
                 <a:solidFill>
                   <a:schemeClr val="tx1">
                     <a:tint val="75000"/>
@@ -2096,9 +2923,9 @@
                 </a:solidFill>
               </a:defRPr>
             </a:lvl6pPr>
-            <a:lvl7pPr marL="1008319" indent="0">
-              <a:buNone/>
-              <a:defRPr sz="587">
+            <a:lvl7pPr marL="1296711" indent="0">
+              <a:buNone/>
+              <a:defRPr sz="756">
                 <a:solidFill>
                   <a:schemeClr val="tx1">
                     <a:tint val="75000"/>
@@ -2106,9 +2933,9 @@
                 </a:solidFill>
               </a:defRPr>
             </a:lvl7pPr>
-            <a:lvl8pPr marL="1176375" indent="0">
-              <a:buNone/>
-              <a:defRPr sz="587">
+            <a:lvl8pPr marL="1512829" indent="0">
+              <a:buNone/>
+              <a:defRPr sz="756">
                 <a:solidFill>
                   <a:schemeClr val="tx1">
                     <a:tint val="75000"/>
@@ -2116,9 +2943,9 @@
                 </a:solidFill>
               </a:defRPr>
             </a:lvl8pPr>
-            <a:lvl9pPr marL="1344427" indent="0">
-              <a:buNone/>
-              <a:defRPr sz="587">
+            <a:lvl9pPr marL="1728948" indent="0">
+              <a:buNone/>
+              <a:defRPr sz="756">
                 <a:solidFill>
                   <a:schemeClr val="tx1">
                     <a:tint val="75000"/>
@@ -2153,7 +2980,7 @@
           <a:p>
             <a:fld id="{CBEA2793-0B76-4EEE-B377-3F0EDC9ABF2D}" type="datetimeFigureOut">
               <a:rPr lang="es-MX" smtClean="0"/>
-              <a:t>12/02/2022</a:t>
+              <a:t>13/02/2022</a:t>
             </a:fld>
             <a:endParaRPr lang="es-MX"/>
           </a:p>
@@ -2204,7 +3031,7 @@
     </p:spTree>
     <p:extLst>
       <p:ext uri="{BB962C8B-B14F-4D97-AF65-F5344CB8AC3E}">
-        <p14:creationId xmlns:p14="http://schemas.microsoft.com/office/powerpoint/2010/main" val="2464003717"/>
+        <p14:creationId xmlns:p14="http://schemas.microsoft.com/office/powerpoint/2010/main" val="3976002081"/>
       </p:ext>
     </p:extLst>
   </p:cSld>
@@ -2266,8 +3093,8 @@
         </p:nvSpPr>
         <p:spPr>
           <a:xfrm>
-            <a:off x="838197" y="671086"/>
-            <a:ext cx="5181601" cy="1599520"/>
+            <a:off x="838200" y="862946"/>
+            <a:ext cx="5181600" cy="2056813"/>
           </a:xfrm>
         </p:spPr>
         <p:txBody>
@@ -2323,8 +3150,8 @@
         </p:nvSpPr>
         <p:spPr>
           <a:xfrm>
-            <a:off x="6172202" y="671086"/>
-            <a:ext cx="5181601" cy="1599520"/>
+            <a:off x="6172200" y="862946"/>
+            <a:ext cx="5181600" cy="2056813"/>
           </a:xfrm>
         </p:spPr>
         <p:txBody>
@@ -2385,7 +3212,7 @@
           <a:p>
             <a:fld id="{CBEA2793-0B76-4EEE-B377-3F0EDC9ABF2D}" type="datetimeFigureOut">
               <a:rPr lang="es-MX" smtClean="0"/>
-              <a:t>12/02/2022</a:t>
+              <a:t>13/02/2022</a:t>
             </a:fld>
             <a:endParaRPr lang="es-MX"/>
           </a:p>
@@ -2436,7 +3263,7 @@
     </p:spTree>
     <p:extLst>
       <p:ext uri="{BB962C8B-B14F-4D97-AF65-F5344CB8AC3E}">
-        <p14:creationId xmlns:p14="http://schemas.microsoft.com/office/powerpoint/2010/main" val="1664182377"/>
+        <p14:creationId xmlns:p14="http://schemas.microsoft.com/office/powerpoint/2010/main" val="3950062888"/>
       </p:ext>
     </p:extLst>
   </p:cSld>
@@ -2475,8 +3302,8 @@
         </p:nvSpPr>
         <p:spPr>
           <a:xfrm>
-            <a:off x="839792" y="134219"/>
-            <a:ext cx="10515599" cy="487267"/>
+            <a:off x="839788" y="172589"/>
+            <a:ext cx="10515600" cy="626574"/>
           </a:xfrm>
         </p:spPr>
         <p:txBody>
@@ -2503,8 +3330,8 @@
         </p:nvSpPr>
         <p:spPr>
           <a:xfrm>
-            <a:off x="839789" y="617983"/>
-            <a:ext cx="5157787" cy="302864"/>
+            <a:off x="839789" y="794661"/>
+            <a:ext cx="5157787" cy="389451"/>
           </a:xfrm>
         </p:spPr>
         <p:txBody>
@@ -2512,39 +3339,39 @@
           <a:lstStyle>
             <a:lvl1pPr marL="0" indent="0">
               <a:buNone/>
-              <a:defRPr sz="880" b="1"/>
+              <a:defRPr sz="1134" b="1"/>
             </a:lvl1pPr>
-            <a:lvl2pPr marL="168051" indent="0">
-              <a:buNone/>
-              <a:defRPr sz="734" b="1"/>
+            <a:lvl2pPr marL="216118" indent="0">
+              <a:buNone/>
+              <a:defRPr sz="945" b="1"/>
             </a:lvl2pPr>
-            <a:lvl3pPr marL="336108" indent="0">
-              <a:buNone/>
-              <a:defRPr sz="660" b="1"/>
+            <a:lvl3pPr marL="432237" indent="0">
+              <a:buNone/>
+              <a:defRPr sz="851" b="1"/>
             </a:lvl3pPr>
-            <a:lvl4pPr marL="504159" indent="0">
-              <a:buNone/>
-              <a:defRPr sz="587" b="1"/>
+            <a:lvl4pPr marL="648355" indent="0">
+              <a:buNone/>
+              <a:defRPr sz="756" b="1"/>
             </a:lvl4pPr>
-            <a:lvl5pPr marL="672216" indent="0">
-              <a:buNone/>
-              <a:defRPr sz="587" b="1"/>
+            <a:lvl5pPr marL="864474" indent="0">
+              <a:buNone/>
+              <a:defRPr sz="756" b="1"/>
             </a:lvl5pPr>
-            <a:lvl6pPr marL="840267" indent="0">
-              <a:buNone/>
-              <a:defRPr sz="587" b="1"/>
+            <a:lvl6pPr marL="1080592" indent="0">
+              <a:buNone/>
+              <a:defRPr sz="756" b="1"/>
             </a:lvl6pPr>
-            <a:lvl7pPr marL="1008319" indent="0">
-              <a:buNone/>
-              <a:defRPr sz="587" b="1"/>
+            <a:lvl7pPr marL="1296711" indent="0">
+              <a:buNone/>
+              <a:defRPr sz="756" b="1"/>
             </a:lvl7pPr>
-            <a:lvl8pPr marL="1176375" indent="0">
-              <a:buNone/>
-              <a:defRPr sz="587" b="1"/>
+            <a:lvl8pPr marL="1512829" indent="0">
+              <a:buNone/>
+              <a:defRPr sz="756" b="1"/>
             </a:lvl8pPr>
-            <a:lvl9pPr marL="1344427" indent="0">
-              <a:buNone/>
-              <a:defRPr sz="587" b="1"/>
+            <a:lvl9pPr marL="1728948" indent="0">
+              <a:buNone/>
+              <a:defRPr sz="756" b="1"/>
             </a:lvl9pPr>
           </a:lstStyle>
           <a:p>
@@ -2568,8 +3395,8 @@
         </p:nvSpPr>
         <p:spPr>
           <a:xfrm>
-            <a:off x="839789" y="920849"/>
-            <a:ext cx="5157787" cy="1354427"/>
+            <a:off x="839789" y="1184112"/>
+            <a:ext cx="5157787" cy="1741650"/>
           </a:xfrm>
         </p:spPr>
         <p:txBody>
@@ -2625,8 +3452,8 @@
         </p:nvSpPr>
         <p:spPr>
           <a:xfrm>
-            <a:off x="6172205" y="617983"/>
-            <a:ext cx="5183186" cy="302864"/>
+            <a:off x="6172200" y="794661"/>
+            <a:ext cx="5183188" cy="389451"/>
           </a:xfrm>
         </p:spPr>
         <p:txBody>
@@ -2634,39 +3461,39 @@
           <a:lstStyle>
             <a:lvl1pPr marL="0" indent="0">
               <a:buNone/>
-              <a:defRPr sz="880" b="1"/>
+              <a:defRPr sz="1134" b="1"/>
             </a:lvl1pPr>
-            <a:lvl2pPr marL="168051" indent="0">
-              <a:buNone/>
-              <a:defRPr sz="734" b="1"/>
+            <a:lvl2pPr marL="216118" indent="0">
+              <a:buNone/>
+              <a:defRPr sz="945" b="1"/>
             </a:lvl2pPr>
-            <a:lvl3pPr marL="336108" indent="0">
-              <a:buNone/>
-              <a:defRPr sz="660" b="1"/>
+            <a:lvl3pPr marL="432237" indent="0">
+              <a:buNone/>
+              <a:defRPr sz="851" b="1"/>
             </a:lvl3pPr>
-            <a:lvl4pPr marL="504159" indent="0">
-              <a:buNone/>
-              <a:defRPr sz="587" b="1"/>
+            <a:lvl4pPr marL="648355" indent="0">
+              <a:buNone/>
+              <a:defRPr sz="756" b="1"/>
             </a:lvl4pPr>
-            <a:lvl5pPr marL="672216" indent="0">
-              <a:buNone/>
-              <a:defRPr sz="587" b="1"/>
+            <a:lvl5pPr marL="864474" indent="0">
+              <a:buNone/>
+              <a:defRPr sz="756" b="1"/>
             </a:lvl5pPr>
-            <a:lvl6pPr marL="840267" indent="0">
-              <a:buNone/>
-              <a:defRPr sz="587" b="1"/>
+            <a:lvl6pPr marL="1080592" indent="0">
+              <a:buNone/>
+              <a:defRPr sz="756" b="1"/>
             </a:lvl6pPr>
-            <a:lvl7pPr marL="1008319" indent="0">
-              <a:buNone/>
-              <a:defRPr sz="587" b="1"/>
+            <a:lvl7pPr marL="1296711" indent="0">
+              <a:buNone/>
+              <a:defRPr sz="756" b="1"/>
             </a:lvl7pPr>
-            <a:lvl8pPr marL="1176375" indent="0">
-              <a:buNone/>
-              <a:defRPr sz="587" b="1"/>
+            <a:lvl8pPr marL="1512829" indent="0">
+              <a:buNone/>
+              <a:defRPr sz="756" b="1"/>
             </a:lvl8pPr>
-            <a:lvl9pPr marL="1344427" indent="0">
-              <a:buNone/>
-              <a:defRPr sz="587" b="1"/>
+            <a:lvl9pPr marL="1728948" indent="0">
+              <a:buNone/>
+              <a:defRPr sz="756" b="1"/>
             </a:lvl9pPr>
           </a:lstStyle>
           <a:p>
@@ -2690,8 +3517,8 @@
         </p:nvSpPr>
         <p:spPr>
           <a:xfrm>
-            <a:off x="6172205" y="920849"/>
-            <a:ext cx="5183186" cy="1354427"/>
+            <a:off x="6172200" y="1184112"/>
+            <a:ext cx="5183188" cy="1741650"/>
           </a:xfrm>
         </p:spPr>
         <p:txBody>
@@ -2752,7 +3579,7 @@
           <a:p>
             <a:fld id="{CBEA2793-0B76-4EEE-B377-3F0EDC9ABF2D}" type="datetimeFigureOut">
               <a:rPr lang="es-MX" smtClean="0"/>
-              <a:t>12/02/2022</a:t>
+              <a:t>13/02/2022</a:t>
             </a:fld>
             <a:endParaRPr lang="es-MX"/>
           </a:p>
@@ -2803,7 +3630,7 @@
     </p:spTree>
     <p:extLst>
       <p:ext uri="{BB962C8B-B14F-4D97-AF65-F5344CB8AC3E}">
-        <p14:creationId xmlns:p14="http://schemas.microsoft.com/office/powerpoint/2010/main" val="3772940880"/>
+        <p14:creationId xmlns:p14="http://schemas.microsoft.com/office/powerpoint/2010/main" val="4059202274"/>
       </p:ext>
     </p:extLst>
   </p:cSld>
@@ -2870,7 +3697,7 @@
           <a:p>
             <a:fld id="{CBEA2793-0B76-4EEE-B377-3F0EDC9ABF2D}" type="datetimeFigureOut">
               <a:rPr lang="es-MX" smtClean="0"/>
-              <a:t>12/02/2022</a:t>
+              <a:t>13/02/2022</a:t>
             </a:fld>
             <a:endParaRPr lang="es-MX"/>
           </a:p>
@@ -2921,7 +3748,7 @@
     </p:spTree>
     <p:extLst>
       <p:ext uri="{BB962C8B-B14F-4D97-AF65-F5344CB8AC3E}">
-        <p14:creationId xmlns:p14="http://schemas.microsoft.com/office/powerpoint/2010/main" val="3361866305"/>
+        <p14:creationId xmlns:p14="http://schemas.microsoft.com/office/powerpoint/2010/main" val="1200657272"/>
       </p:ext>
     </p:extLst>
   </p:cSld>
@@ -2965,7 +3792,7 @@
           <a:p>
             <a:fld id="{CBEA2793-0B76-4EEE-B377-3F0EDC9ABF2D}" type="datetimeFigureOut">
               <a:rPr lang="es-MX" smtClean="0"/>
-              <a:t>12/02/2022</a:t>
+              <a:t>13/02/2022</a:t>
             </a:fld>
             <a:endParaRPr lang="es-MX"/>
           </a:p>
@@ -3016,7 +3843,7 @@
     </p:spTree>
     <p:extLst>
       <p:ext uri="{BB962C8B-B14F-4D97-AF65-F5344CB8AC3E}">
-        <p14:creationId xmlns:p14="http://schemas.microsoft.com/office/powerpoint/2010/main" val="3414656744"/>
+        <p14:creationId xmlns:p14="http://schemas.microsoft.com/office/powerpoint/2010/main" val="3971803457"/>
       </p:ext>
     </p:extLst>
   </p:cSld>
@@ -3055,15 +3882,15 @@
         </p:nvSpPr>
         <p:spPr>
           <a:xfrm>
-            <a:off x="839789" y="168063"/>
-            <a:ext cx="3932238" cy="588222"/>
+            <a:off x="839789" y="216112"/>
+            <a:ext cx="3932237" cy="756391"/>
           </a:xfrm>
         </p:spPr>
         <p:txBody>
           <a:bodyPr anchor="b"/>
           <a:lstStyle>
             <a:lvl1pPr>
-              <a:defRPr sz="1174"/>
+              <a:defRPr sz="1513"/>
             </a:lvl1pPr>
           </a:lstStyle>
           <a:p>
@@ -3087,39 +3914,39 @@
         </p:nvSpPr>
         <p:spPr>
           <a:xfrm>
-            <a:off x="5183186" y="362971"/>
-            <a:ext cx="6172202" cy="1791508"/>
+            <a:off x="5183188" y="466742"/>
+            <a:ext cx="6172200" cy="2303690"/>
           </a:xfrm>
         </p:spPr>
         <p:txBody>
           <a:bodyPr/>
           <a:lstStyle>
             <a:lvl1pPr>
-              <a:defRPr sz="1174"/>
+              <a:defRPr sz="1513"/>
             </a:lvl1pPr>
             <a:lvl2pPr>
-              <a:defRPr sz="1027"/>
+              <a:defRPr sz="1324"/>
             </a:lvl2pPr>
             <a:lvl3pPr>
-              <a:defRPr sz="880"/>
+              <a:defRPr sz="1134"/>
             </a:lvl3pPr>
             <a:lvl4pPr>
-              <a:defRPr sz="734"/>
+              <a:defRPr sz="945"/>
             </a:lvl4pPr>
             <a:lvl5pPr>
-              <a:defRPr sz="734"/>
+              <a:defRPr sz="945"/>
             </a:lvl5pPr>
             <a:lvl6pPr>
-              <a:defRPr sz="734"/>
+              <a:defRPr sz="945"/>
             </a:lvl6pPr>
             <a:lvl7pPr>
-              <a:defRPr sz="734"/>
+              <a:defRPr sz="945"/>
             </a:lvl7pPr>
             <a:lvl8pPr>
-              <a:defRPr sz="734"/>
+              <a:defRPr sz="945"/>
             </a:lvl8pPr>
             <a:lvl9pPr>
-              <a:defRPr sz="734"/>
+              <a:defRPr sz="945"/>
             </a:lvl9pPr>
           </a:lstStyle>
           <a:p>
@@ -3172,8 +3999,8 @@
         </p:nvSpPr>
         <p:spPr>
           <a:xfrm>
-            <a:off x="839789" y="756285"/>
-            <a:ext cx="3932238" cy="1401112"/>
+            <a:off x="839789" y="972503"/>
+            <a:ext cx="3932237" cy="1801681"/>
           </a:xfrm>
         </p:spPr>
         <p:txBody>
@@ -3181,39 +4008,39 @@
           <a:lstStyle>
             <a:lvl1pPr marL="0" indent="0">
               <a:buNone/>
-              <a:defRPr sz="587"/>
+              <a:defRPr sz="756"/>
             </a:lvl1pPr>
-            <a:lvl2pPr marL="168051" indent="0">
-              <a:buNone/>
-              <a:defRPr sz="564"/>
+            <a:lvl2pPr marL="216118" indent="0">
+              <a:buNone/>
+              <a:defRPr sz="662"/>
             </a:lvl2pPr>
-            <a:lvl3pPr marL="336108" indent="0">
-              <a:buNone/>
-              <a:defRPr sz="564"/>
+            <a:lvl3pPr marL="432237" indent="0">
+              <a:buNone/>
+              <a:defRPr sz="567"/>
             </a:lvl3pPr>
-            <a:lvl4pPr marL="504159" indent="0">
-              <a:buNone/>
-              <a:defRPr sz="564"/>
+            <a:lvl4pPr marL="648355" indent="0">
+              <a:buNone/>
+              <a:defRPr sz="473"/>
             </a:lvl4pPr>
-            <a:lvl5pPr marL="672216" indent="0">
-              <a:buNone/>
-              <a:defRPr sz="564"/>
+            <a:lvl5pPr marL="864474" indent="0">
+              <a:buNone/>
+              <a:defRPr sz="473"/>
             </a:lvl5pPr>
-            <a:lvl6pPr marL="840267" indent="0">
-              <a:buNone/>
-              <a:defRPr sz="564"/>
+            <a:lvl6pPr marL="1080592" indent="0">
+              <a:buNone/>
+              <a:defRPr sz="473"/>
             </a:lvl6pPr>
-            <a:lvl7pPr marL="1008319" indent="0">
-              <a:buNone/>
-              <a:defRPr sz="564"/>
+            <a:lvl7pPr marL="1296711" indent="0">
+              <a:buNone/>
+              <a:defRPr sz="473"/>
             </a:lvl7pPr>
-            <a:lvl8pPr marL="1176375" indent="0">
-              <a:buNone/>
-              <a:defRPr sz="564"/>
+            <a:lvl8pPr marL="1512829" indent="0">
+              <a:buNone/>
+              <a:defRPr sz="473"/>
             </a:lvl8pPr>
-            <a:lvl9pPr marL="1344427" indent="0">
-              <a:buNone/>
-              <a:defRPr sz="564"/>
+            <a:lvl9pPr marL="1728948" indent="0">
+              <a:buNone/>
+              <a:defRPr sz="473"/>
             </a:lvl9pPr>
           </a:lstStyle>
           <a:p>
@@ -3242,7 +4069,7 @@
           <a:p>
             <a:fld id="{CBEA2793-0B76-4EEE-B377-3F0EDC9ABF2D}" type="datetimeFigureOut">
               <a:rPr lang="es-MX" smtClean="0"/>
-              <a:t>12/02/2022</a:t>
+              <a:t>13/02/2022</a:t>
             </a:fld>
             <a:endParaRPr lang="es-MX"/>
           </a:p>
@@ -3293,7 +4120,7 @@
     </p:spTree>
     <p:extLst>
       <p:ext uri="{BB962C8B-B14F-4D97-AF65-F5344CB8AC3E}">
-        <p14:creationId xmlns:p14="http://schemas.microsoft.com/office/powerpoint/2010/main" val="1060079512"/>
+        <p14:creationId xmlns:p14="http://schemas.microsoft.com/office/powerpoint/2010/main" val="3052749898"/>
       </p:ext>
     </p:extLst>
   </p:cSld>
@@ -3332,15 +4159,15 @@
         </p:nvSpPr>
         <p:spPr>
           <a:xfrm>
-            <a:off x="839789" y="168063"/>
-            <a:ext cx="3932238" cy="588222"/>
+            <a:off x="839789" y="216112"/>
+            <a:ext cx="3932237" cy="756391"/>
           </a:xfrm>
         </p:spPr>
         <p:txBody>
           <a:bodyPr anchor="b"/>
           <a:lstStyle>
             <a:lvl1pPr>
-              <a:defRPr sz="1174"/>
+              <a:defRPr sz="1513"/>
             </a:lvl1pPr>
           </a:lstStyle>
           <a:p>
@@ -3364,8 +4191,8 @@
         </p:nvSpPr>
         <p:spPr>
           <a:xfrm>
-            <a:off x="5183186" y="362971"/>
-            <a:ext cx="6172202" cy="1791508"/>
+            <a:off x="5183188" y="466742"/>
+            <a:ext cx="6172200" cy="2303690"/>
           </a:xfrm>
         </p:spPr>
         <p:txBody>
@@ -3373,39 +4200,39 @@
           <a:lstStyle>
             <a:lvl1pPr marL="0" indent="0">
               <a:buNone/>
-              <a:defRPr sz="1174"/>
+              <a:defRPr sz="1513"/>
             </a:lvl1pPr>
-            <a:lvl2pPr marL="168051" indent="0">
-              <a:buNone/>
-              <a:defRPr sz="1027"/>
+            <a:lvl2pPr marL="216118" indent="0">
+              <a:buNone/>
+              <a:defRPr sz="1324"/>
             </a:lvl2pPr>
-            <a:lvl3pPr marL="336108" indent="0">
-              <a:buNone/>
-              <a:defRPr sz="880"/>
+            <a:lvl3pPr marL="432237" indent="0">
+              <a:buNone/>
+              <a:defRPr sz="1134"/>
             </a:lvl3pPr>
-            <a:lvl4pPr marL="504159" indent="0">
-              <a:buNone/>
-              <a:defRPr sz="734"/>
+            <a:lvl4pPr marL="648355" indent="0">
+              <a:buNone/>
+              <a:defRPr sz="945"/>
             </a:lvl4pPr>
-            <a:lvl5pPr marL="672216" indent="0">
-              <a:buNone/>
-              <a:defRPr sz="734"/>
+            <a:lvl5pPr marL="864474" indent="0">
+              <a:buNone/>
+              <a:defRPr sz="945"/>
             </a:lvl5pPr>
-            <a:lvl6pPr marL="840267" indent="0">
-              <a:buNone/>
-              <a:defRPr sz="734"/>
+            <a:lvl6pPr marL="1080592" indent="0">
+              <a:buNone/>
+              <a:defRPr sz="945"/>
             </a:lvl6pPr>
-            <a:lvl7pPr marL="1008319" indent="0">
-              <a:buNone/>
-              <a:defRPr sz="734"/>
+            <a:lvl7pPr marL="1296711" indent="0">
+              <a:buNone/>
+              <a:defRPr sz="945"/>
             </a:lvl7pPr>
-            <a:lvl8pPr marL="1176375" indent="0">
-              <a:buNone/>
-              <a:defRPr sz="734"/>
+            <a:lvl8pPr marL="1512829" indent="0">
+              <a:buNone/>
+              <a:defRPr sz="945"/>
             </a:lvl8pPr>
-            <a:lvl9pPr marL="1344427" indent="0">
-              <a:buNone/>
-              <a:defRPr sz="734"/>
+            <a:lvl9pPr marL="1728948" indent="0">
+              <a:buNone/>
+              <a:defRPr sz="945"/>
             </a:lvl9pPr>
           </a:lstStyle>
           <a:p>
@@ -3429,8 +4256,8 @@
         </p:nvSpPr>
         <p:spPr>
           <a:xfrm>
-            <a:off x="839789" y="756285"/>
-            <a:ext cx="3932238" cy="1401112"/>
+            <a:off x="839789" y="972503"/>
+            <a:ext cx="3932237" cy="1801681"/>
           </a:xfrm>
         </p:spPr>
         <p:txBody>
@@ -3438,39 +4265,39 @@
           <a:lstStyle>
             <a:lvl1pPr marL="0" indent="0">
               <a:buNone/>
-              <a:defRPr sz="587"/>
+              <a:defRPr sz="756"/>
             </a:lvl1pPr>
-            <a:lvl2pPr marL="168051" indent="0">
-              <a:buNone/>
-              <a:defRPr sz="564"/>
+            <a:lvl2pPr marL="216118" indent="0">
+              <a:buNone/>
+              <a:defRPr sz="662"/>
             </a:lvl2pPr>
-            <a:lvl3pPr marL="336108" indent="0">
-              <a:buNone/>
-              <a:defRPr sz="564"/>
+            <a:lvl3pPr marL="432237" indent="0">
+              <a:buNone/>
+              <a:defRPr sz="567"/>
             </a:lvl3pPr>
-            <a:lvl4pPr marL="504159" indent="0">
-              <a:buNone/>
-              <a:defRPr sz="564"/>
+            <a:lvl4pPr marL="648355" indent="0">
+              <a:buNone/>
+              <a:defRPr sz="473"/>
             </a:lvl4pPr>
-            <a:lvl5pPr marL="672216" indent="0">
-              <a:buNone/>
-              <a:defRPr sz="564"/>
+            <a:lvl5pPr marL="864474" indent="0">
+              <a:buNone/>
+              <a:defRPr sz="473"/>
             </a:lvl5pPr>
-            <a:lvl6pPr marL="840267" indent="0">
-              <a:buNone/>
-              <a:defRPr sz="564"/>
+            <a:lvl6pPr marL="1080592" indent="0">
+              <a:buNone/>
+              <a:defRPr sz="473"/>
             </a:lvl6pPr>
-            <a:lvl7pPr marL="1008319" indent="0">
-              <a:buNone/>
-              <a:defRPr sz="564"/>
+            <a:lvl7pPr marL="1296711" indent="0">
+              <a:buNone/>
+              <a:defRPr sz="473"/>
             </a:lvl7pPr>
-            <a:lvl8pPr marL="1176375" indent="0">
-              <a:buNone/>
-              <a:defRPr sz="564"/>
+            <a:lvl8pPr marL="1512829" indent="0">
+              <a:buNone/>
+              <a:defRPr sz="473"/>
             </a:lvl8pPr>
-            <a:lvl9pPr marL="1344427" indent="0">
-              <a:buNone/>
-              <a:defRPr sz="564"/>
+            <a:lvl9pPr marL="1728948" indent="0">
+              <a:buNone/>
+              <a:defRPr sz="473"/>
             </a:lvl9pPr>
           </a:lstStyle>
           <a:p>
@@ -3499,7 +4326,7 @@
           <a:p>
             <a:fld id="{CBEA2793-0B76-4EEE-B377-3F0EDC9ABF2D}" type="datetimeFigureOut">
               <a:rPr lang="es-MX" smtClean="0"/>
-              <a:t>12/02/2022</a:t>
+              <a:t>13/02/2022</a:t>
             </a:fld>
             <a:endParaRPr lang="es-MX"/>
           </a:p>
@@ -3550,7 +4377,7 @@
     </p:spTree>
     <p:extLst>
       <p:ext uri="{BB962C8B-B14F-4D97-AF65-F5344CB8AC3E}">
-        <p14:creationId xmlns:p14="http://schemas.microsoft.com/office/powerpoint/2010/main" val="3122386555"/>
+        <p14:creationId xmlns:p14="http://schemas.microsoft.com/office/powerpoint/2010/main" val="961528569"/>
       </p:ext>
     </p:extLst>
   </p:cSld>
@@ -3594,8 +4421,8 @@
         </p:nvSpPr>
         <p:spPr>
           <a:xfrm>
-            <a:off x="838206" y="134219"/>
-            <a:ext cx="10515599" cy="487267"/>
+            <a:off x="838200" y="172589"/>
+            <a:ext cx="10515600" cy="626574"/>
           </a:xfrm>
           <a:prstGeom prst="rect">
             <a:avLst/>
@@ -3627,8 +4454,8 @@
         </p:nvSpPr>
         <p:spPr>
           <a:xfrm>
-            <a:off x="838206" y="671086"/>
-            <a:ext cx="10515599" cy="1599520"/>
+            <a:off x="838200" y="862946"/>
+            <a:ext cx="10515600" cy="2056813"/>
           </a:xfrm>
           <a:prstGeom prst="rect">
             <a:avLst/>
@@ -3689,8 +4516,8 @@
         </p:nvSpPr>
         <p:spPr>
           <a:xfrm>
-            <a:off x="838203" y="2336549"/>
-            <a:ext cx="2743198" cy="134217"/>
+            <a:off x="838200" y="3004553"/>
+            <a:ext cx="2743200" cy="172589"/>
           </a:xfrm>
           <a:prstGeom prst="rect">
             <a:avLst/>
@@ -3700,7 +4527,7 @@
           <a:bodyPr vert="horz" lIns="91440" tIns="45720" rIns="91440" bIns="45720" rtlCol="0" anchor="ctr"/>
           <a:lstStyle>
             <a:lvl1pPr algn="l">
-              <a:defRPr sz="564">
+              <a:defRPr sz="567">
                 <a:solidFill>
                   <a:schemeClr val="tx1">
                     <a:tint val="75000"/>
@@ -3712,7 +4539,7 @@
           <a:p>
             <a:fld id="{CBEA2793-0B76-4EEE-B377-3F0EDC9ABF2D}" type="datetimeFigureOut">
               <a:rPr lang="es-MX" smtClean="0"/>
-              <a:t>12/02/2022</a:t>
+              <a:t>13/02/2022</a:t>
             </a:fld>
             <a:endParaRPr lang="es-MX"/>
           </a:p>
@@ -3730,8 +4557,8 @@
         </p:nvSpPr>
         <p:spPr>
           <a:xfrm>
-            <a:off x="4038602" y="2336549"/>
-            <a:ext cx="4114797" cy="134217"/>
+            <a:off x="4038600" y="3004553"/>
+            <a:ext cx="4114800" cy="172589"/>
           </a:xfrm>
           <a:prstGeom prst="rect">
             <a:avLst/>
@@ -3741,7 +4568,7 @@
           <a:bodyPr vert="horz" lIns="91440" tIns="45720" rIns="91440" bIns="45720" rtlCol="0" anchor="ctr"/>
           <a:lstStyle>
             <a:lvl1pPr algn="ctr">
-              <a:defRPr sz="564">
+              <a:defRPr sz="567">
                 <a:solidFill>
                   <a:schemeClr val="tx1">
                     <a:tint val="75000"/>
@@ -3767,8 +4594,8 @@
         </p:nvSpPr>
         <p:spPr>
           <a:xfrm>
-            <a:off x="8610599" y="2336549"/>
-            <a:ext cx="2743198" cy="134217"/>
+            <a:off x="8610600" y="3004553"/>
+            <a:ext cx="2743200" cy="172589"/>
           </a:xfrm>
           <a:prstGeom prst="rect">
             <a:avLst/>
@@ -3778,7 +4605,7 @@
           <a:bodyPr vert="horz" lIns="91440" tIns="45720" rIns="91440" bIns="45720" rtlCol="0" anchor="ctr"/>
           <a:lstStyle>
             <a:lvl1pPr algn="r">
-              <a:defRPr sz="564">
+              <a:defRPr sz="567">
                 <a:solidFill>
                   <a:schemeClr val="tx1">
                     <a:tint val="75000"/>
@@ -3799,27 +4626,27 @@
     </p:spTree>
     <p:extLst>
       <p:ext uri="{BB962C8B-B14F-4D97-AF65-F5344CB8AC3E}">
-        <p14:creationId xmlns:p14="http://schemas.microsoft.com/office/powerpoint/2010/main" val="3642792616"/>
+        <p14:creationId xmlns:p14="http://schemas.microsoft.com/office/powerpoint/2010/main" val="3818227123"/>
       </p:ext>
     </p:extLst>
   </p:cSld>
   <p:clrMap bg1="dk1" tx1="lt1" bg2="dk2" tx2="lt2" accent1="accent1" accent2="accent2" accent3="accent3" accent4="accent4" accent5="accent5" accent6="accent6" hlink="hlink" folHlink="folHlink"/>
   <p:sldLayoutIdLst>
-    <p:sldLayoutId id="2147483685" r:id="rId1"/>
-    <p:sldLayoutId id="2147483686" r:id="rId2"/>
-    <p:sldLayoutId id="2147483687" r:id="rId3"/>
-    <p:sldLayoutId id="2147483688" r:id="rId4"/>
-    <p:sldLayoutId id="2147483689" r:id="rId5"/>
-    <p:sldLayoutId id="2147483690" r:id="rId6"/>
-    <p:sldLayoutId id="2147483691" r:id="rId7"/>
-    <p:sldLayoutId id="2147483692" r:id="rId8"/>
-    <p:sldLayoutId id="2147483693" r:id="rId9"/>
-    <p:sldLayoutId id="2147483694" r:id="rId10"/>
-    <p:sldLayoutId id="2147483695" r:id="rId11"/>
+    <p:sldLayoutId id="2147483697" r:id="rId1"/>
+    <p:sldLayoutId id="2147483698" r:id="rId2"/>
+    <p:sldLayoutId id="2147483699" r:id="rId3"/>
+    <p:sldLayoutId id="2147483700" r:id="rId4"/>
+    <p:sldLayoutId id="2147483701" r:id="rId5"/>
+    <p:sldLayoutId id="2147483702" r:id="rId6"/>
+    <p:sldLayoutId id="2147483703" r:id="rId7"/>
+    <p:sldLayoutId id="2147483704" r:id="rId8"/>
+    <p:sldLayoutId id="2147483705" r:id="rId9"/>
+    <p:sldLayoutId id="2147483706" r:id="rId10"/>
+    <p:sldLayoutId id="2147483707" r:id="rId11"/>
   </p:sldLayoutIdLst>
   <p:txStyles>
     <p:titleStyle>
-      <a:lvl1pPr algn="l" defTabSz="336108" rtl="0" eaLnBrk="1" latinLnBrk="0" hangingPunct="1">
+      <a:lvl1pPr algn="l" defTabSz="432237" rtl="0" eaLnBrk="1" latinLnBrk="0" hangingPunct="1">
         <a:lnSpc>
           <a:spcPct val="90000"/>
         </a:lnSpc>
@@ -3827,7 +4654,7 @@
           <a:spcPct val="0"/>
         </a:spcBef>
         <a:buNone/>
-        <a:defRPr sz="1620" kern="1200">
+        <a:defRPr sz="2080" kern="1200">
           <a:solidFill>
             <a:schemeClr val="tx1"/>
           </a:solidFill>
@@ -3838,16 +4665,16 @@
       </a:lvl1pPr>
     </p:titleStyle>
     <p:bodyStyle>
-      <a:lvl1pPr marL="84028" indent="-84028" algn="l" defTabSz="336108" rtl="0" eaLnBrk="1" latinLnBrk="0" hangingPunct="1">
+      <a:lvl1pPr marL="108059" indent="-108059" algn="l" defTabSz="432237" rtl="0" eaLnBrk="1" latinLnBrk="0" hangingPunct="1">
         <a:lnSpc>
           <a:spcPct val="90000"/>
         </a:lnSpc>
         <a:spcBef>
-          <a:spcPts val="367"/>
+          <a:spcPts val="473"/>
         </a:spcBef>
         <a:buFont typeface="Arial" panose="020B0604020202020204" pitchFamily="34" charset="0"/>
         <a:buChar char="•"/>
-        <a:defRPr sz="1027" kern="1200">
+        <a:defRPr sz="1324" kern="1200">
           <a:solidFill>
             <a:schemeClr val="tx1"/>
           </a:solidFill>
@@ -3856,16 +4683,16 @@
           <a:cs typeface="+mn-cs"/>
         </a:defRPr>
       </a:lvl1pPr>
-      <a:lvl2pPr marL="252080" indent="-84028" algn="l" defTabSz="336108" rtl="0" eaLnBrk="1" latinLnBrk="0" hangingPunct="1">
+      <a:lvl2pPr marL="324178" indent="-108059" algn="l" defTabSz="432237" rtl="0" eaLnBrk="1" latinLnBrk="0" hangingPunct="1">
         <a:lnSpc>
           <a:spcPct val="90000"/>
         </a:lnSpc>
         <a:spcBef>
-          <a:spcPts val="186"/>
+          <a:spcPts val="236"/>
         </a:spcBef>
         <a:buFont typeface="Arial" panose="020B0604020202020204" pitchFamily="34" charset="0"/>
         <a:buChar char="•"/>
-        <a:defRPr sz="880" kern="1200">
+        <a:defRPr sz="1134" kern="1200">
           <a:solidFill>
             <a:schemeClr val="tx1"/>
           </a:solidFill>
@@ -3874,16 +4701,16 @@
           <a:cs typeface="+mn-cs"/>
         </a:defRPr>
       </a:lvl2pPr>
-      <a:lvl3pPr marL="420136" indent="-84028" algn="l" defTabSz="336108" rtl="0" eaLnBrk="1" latinLnBrk="0" hangingPunct="1">
+      <a:lvl3pPr marL="540296" indent="-108059" algn="l" defTabSz="432237" rtl="0" eaLnBrk="1" latinLnBrk="0" hangingPunct="1">
         <a:lnSpc>
           <a:spcPct val="90000"/>
         </a:lnSpc>
         <a:spcBef>
-          <a:spcPts val="186"/>
+          <a:spcPts val="236"/>
         </a:spcBef>
         <a:buFont typeface="Arial" panose="020B0604020202020204" pitchFamily="34" charset="0"/>
         <a:buChar char="•"/>
-        <a:defRPr sz="734" kern="1200">
+        <a:defRPr sz="945" kern="1200">
           <a:solidFill>
             <a:schemeClr val="tx1"/>
           </a:solidFill>
@@ -3892,16 +4719,16 @@
           <a:cs typeface="+mn-cs"/>
         </a:defRPr>
       </a:lvl3pPr>
-      <a:lvl4pPr marL="588188" indent="-84028" algn="l" defTabSz="336108" rtl="0" eaLnBrk="1" latinLnBrk="0" hangingPunct="1">
+      <a:lvl4pPr marL="756415" indent="-108059" algn="l" defTabSz="432237" rtl="0" eaLnBrk="1" latinLnBrk="0" hangingPunct="1">
         <a:lnSpc>
           <a:spcPct val="90000"/>
         </a:lnSpc>
         <a:spcBef>
-          <a:spcPts val="186"/>
+          <a:spcPts val="236"/>
         </a:spcBef>
         <a:buFont typeface="Arial" panose="020B0604020202020204" pitchFamily="34" charset="0"/>
         <a:buChar char="•"/>
-        <a:defRPr sz="660" kern="1200">
+        <a:defRPr sz="851" kern="1200">
           <a:solidFill>
             <a:schemeClr val="tx1"/>
           </a:solidFill>
@@ -3910,16 +4737,16 @@
           <a:cs typeface="+mn-cs"/>
         </a:defRPr>
       </a:lvl4pPr>
-      <a:lvl5pPr marL="756239" indent="-84028" algn="l" defTabSz="336108" rtl="0" eaLnBrk="1" latinLnBrk="0" hangingPunct="1">
+      <a:lvl5pPr marL="972533" indent="-108059" algn="l" defTabSz="432237" rtl="0" eaLnBrk="1" latinLnBrk="0" hangingPunct="1">
         <a:lnSpc>
           <a:spcPct val="90000"/>
         </a:lnSpc>
         <a:spcBef>
-          <a:spcPts val="186"/>
+          <a:spcPts val="236"/>
         </a:spcBef>
         <a:buFont typeface="Arial" panose="020B0604020202020204" pitchFamily="34" charset="0"/>
         <a:buChar char="•"/>
-        <a:defRPr sz="660" kern="1200">
+        <a:defRPr sz="851" kern="1200">
           <a:solidFill>
             <a:schemeClr val="tx1"/>
           </a:solidFill>
@@ -3928,16 +4755,16 @@
           <a:cs typeface="+mn-cs"/>
         </a:defRPr>
       </a:lvl5pPr>
-      <a:lvl6pPr marL="924296" indent="-84028" algn="l" defTabSz="336108" rtl="0" eaLnBrk="1" latinLnBrk="0" hangingPunct="1">
+      <a:lvl6pPr marL="1188651" indent="-108059" algn="l" defTabSz="432237" rtl="0" eaLnBrk="1" latinLnBrk="0" hangingPunct="1">
         <a:lnSpc>
           <a:spcPct val="90000"/>
         </a:lnSpc>
         <a:spcBef>
-          <a:spcPts val="186"/>
+          <a:spcPts val="236"/>
         </a:spcBef>
         <a:buFont typeface="Arial" panose="020B0604020202020204" pitchFamily="34" charset="0"/>
         <a:buChar char="•"/>
-        <a:defRPr sz="660" kern="1200">
+        <a:defRPr sz="851" kern="1200">
           <a:solidFill>
             <a:schemeClr val="tx1"/>
           </a:solidFill>
@@ -3946,16 +4773,16 @@
           <a:cs typeface="+mn-cs"/>
         </a:defRPr>
       </a:lvl6pPr>
-      <a:lvl7pPr marL="1092347" indent="-84028" algn="l" defTabSz="336108" rtl="0" eaLnBrk="1" latinLnBrk="0" hangingPunct="1">
+      <a:lvl7pPr marL="1404770" indent="-108059" algn="l" defTabSz="432237" rtl="0" eaLnBrk="1" latinLnBrk="0" hangingPunct="1">
         <a:lnSpc>
           <a:spcPct val="90000"/>
         </a:lnSpc>
         <a:spcBef>
-          <a:spcPts val="186"/>
+          <a:spcPts val="236"/>
         </a:spcBef>
         <a:buFont typeface="Arial" panose="020B0604020202020204" pitchFamily="34" charset="0"/>
         <a:buChar char="•"/>
-        <a:defRPr sz="660" kern="1200">
+        <a:defRPr sz="851" kern="1200">
           <a:solidFill>
             <a:schemeClr val="tx1"/>
           </a:solidFill>
@@ -3964,16 +4791,16 @@
           <a:cs typeface="+mn-cs"/>
         </a:defRPr>
       </a:lvl7pPr>
-      <a:lvl8pPr marL="1260404" indent="-84028" algn="l" defTabSz="336108" rtl="0" eaLnBrk="1" latinLnBrk="0" hangingPunct="1">
+      <a:lvl8pPr marL="1620888" indent="-108059" algn="l" defTabSz="432237" rtl="0" eaLnBrk="1" latinLnBrk="0" hangingPunct="1">
         <a:lnSpc>
           <a:spcPct val="90000"/>
         </a:lnSpc>
         <a:spcBef>
-          <a:spcPts val="186"/>
+          <a:spcPts val="236"/>
         </a:spcBef>
         <a:buFont typeface="Arial" panose="020B0604020202020204" pitchFamily="34" charset="0"/>
         <a:buChar char="•"/>
-        <a:defRPr sz="660" kern="1200">
+        <a:defRPr sz="851" kern="1200">
           <a:solidFill>
             <a:schemeClr val="tx1"/>
           </a:solidFill>
@@ -3982,16 +4809,16 @@
           <a:cs typeface="+mn-cs"/>
         </a:defRPr>
       </a:lvl8pPr>
-      <a:lvl9pPr marL="1428455" indent="-84028" algn="l" defTabSz="336108" rtl="0" eaLnBrk="1" latinLnBrk="0" hangingPunct="1">
+      <a:lvl9pPr marL="1837007" indent="-108059" algn="l" defTabSz="432237" rtl="0" eaLnBrk="1" latinLnBrk="0" hangingPunct="1">
         <a:lnSpc>
           <a:spcPct val="90000"/>
         </a:lnSpc>
         <a:spcBef>
-          <a:spcPts val="186"/>
+          <a:spcPts val="236"/>
         </a:spcBef>
         <a:buFont typeface="Arial" panose="020B0604020202020204" pitchFamily="34" charset="0"/>
         <a:buChar char="•"/>
-        <a:defRPr sz="660" kern="1200">
+        <a:defRPr sz="851" kern="1200">
           <a:solidFill>
             <a:schemeClr val="tx1"/>
           </a:solidFill>
@@ -4005,8 +4832,8 @@
       <a:defPPr>
         <a:defRPr lang="en-US"/>
       </a:defPPr>
-      <a:lvl1pPr marL="0" algn="l" defTabSz="336108" rtl="0" eaLnBrk="1" latinLnBrk="0" hangingPunct="1">
-        <a:defRPr sz="660" kern="1200">
+      <a:lvl1pPr marL="0" algn="l" defTabSz="432237" rtl="0" eaLnBrk="1" latinLnBrk="0" hangingPunct="1">
+        <a:defRPr sz="851" kern="1200">
           <a:solidFill>
             <a:schemeClr val="tx1"/>
           </a:solidFill>
@@ -4015,8 +4842,8 @@
           <a:cs typeface="+mn-cs"/>
         </a:defRPr>
       </a:lvl1pPr>
-      <a:lvl2pPr marL="168051" algn="l" defTabSz="336108" rtl="0" eaLnBrk="1" latinLnBrk="0" hangingPunct="1">
-        <a:defRPr sz="660" kern="1200">
+      <a:lvl2pPr marL="216118" algn="l" defTabSz="432237" rtl="0" eaLnBrk="1" latinLnBrk="0" hangingPunct="1">
+        <a:defRPr sz="851" kern="1200">
           <a:solidFill>
             <a:schemeClr val="tx1"/>
           </a:solidFill>
@@ -4025,8 +4852,8 @@
           <a:cs typeface="+mn-cs"/>
         </a:defRPr>
       </a:lvl2pPr>
-      <a:lvl3pPr marL="336108" algn="l" defTabSz="336108" rtl="0" eaLnBrk="1" latinLnBrk="0" hangingPunct="1">
-        <a:defRPr sz="660" kern="1200">
+      <a:lvl3pPr marL="432237" algn="l" defTabSz="432237" rtl="0" eaLnBrk="1" latinLnBrk="0" hangingPunct="1">
+        <a:defRPr sz="851" kern="1200">
           <a:solidFill>
             <a:schemeClr val="tx1"/>
           </a:solidFill>
@@ -4035,8 +4862,8 @@
           <a:cs typeface="+mn-cs"/>
         </a:defRPr>
       </a:lvl3pPr>
-      <a:lvl4pPr marL="504159" algn="l" defTabSz="336108" rtl="0" eaLnBrk="1" latinLnBrk="0" hangingPunct="1">
-        <a:defRPr sz="660" kern="1200">
+      <a:lvl4pPr marL="648355" algn="l" defTabSz="432237" rtl="0" eaLnBrk="1" latinLnBrk="0" hangingPunct="1">
+        <a:defRPr sz="851" kern="1200">
           <a:solidFill>
             <a:schemeClr val="tx1"/>
           </a:solidFill>
@@ -4045,8 +4872,8 @@
           <a:cs typeface="+mn-cs"/>
         </a:defRPr>
       </a:lvl4pPr>
-      <a:lvl5pPr marL="672216" algn="l" defTabSz="336108" rtl="0" eaLnBrk="1" latinLnBrk="0" hangingPunct="1">
-        <a:defRPr sz="660" kern="1200">
+      <a:lvl5pPr marL="864474" algn="l" defTabSz="432237" rtl="0" eaLnBrk="1" latinLnBrk="0" hangingPunct="1">
+        <a:defRPr sz="851" kern="1200">
           <a:solidFill>
             <a:schemeClr val="tx1"/>
           </a:solidFill>
@@ -4055,8 +4882,8 @@
           <a:cs typeface="+mn-cs"/>
         </a:defRPr>
       </a:lvl5pPr>
-      <a:lvl6pPr marL="840267" algn="l" defTabSz="336108" rtl="0" eaLnBrk="1" latinLnBrk="0" hangingPunct="1">
-        <a:defRPr sz="660" kern="1200">
+      <a:lvl6pPr marL="1080592" algn="l" defTabSz="432237" rtl="0" eaLnBrk="1" latinLnBrk="0" hangingPunct="1">
+        <a:defRPr sz="851" kern="1200">
           <a:solidFill>
             <a:schemeClr val="tx1"/>
           </a:solidFill>
@@ -4065,8 +4892,8 @@
           <a:cs typeface="+mn-cs"/>
         </a:defRPr>
       </a:lvl6pPr>
-      <a:lvl7pPr marL="1008319" algn="l" defTabSz="336108" rtl="0" eaLnBrk="1" latinLnBrk="0" hangingPunct="1">
-        <a:defRPr sz="660" kern="1200">
+      <a:lvl7pPr marL="1296711" algn="l" defTabSz="432237" rtl="0" eaLnBrk="1" latinLnBrk="0" hangingPunct="1">
+        <a:defRPr sz="851" kern="1200">
           <a:solidFill>
             <a:schemeClr val="tx1"/>
           </a:solidFill>
@@ -4075,8 +4902,8 @@
           <a:cs typeface="+mn-cs"/>
         </a:defRPr>
       </a:lvl7pPr>
-      <a:lvl8pPr marL="1176375" algn="l" defTabSz="336108" rtl="0" eaLnBrk="1" latinLnBrk="0" hangingPunct="1">
-        <a:defRPr sz="660" kern="1200">
+      <a:lvl8pPr marL="1512829" algn="l" defTabSz="432237" rtl="0" eaLnBrk="1" latinLnBrk="0" hangingPunct="1">
+        <a:defRPr sz="851" kern="1200">
           <a:solidFill>
             <a:schemeClr val="tx1"/>
           </a:solidFill>
@@ -4085,8 +4912,8 @@
           <a:cs typeface="+mn-cs"/>
         </a:defRPr>
       </a:lvl8pPr>
-      <a:lvl9pPr marL="1344427" algn="l" defTabSz="336108" rtl="0" eaLnBrk="1" latinLnBrk="0" hangingPunct="1">
-        <a:defRPr sz="660" kern="1200">
+      <a:lvl9pPr marL="1728948" algn="l" defTabSz="432237" rtl="0" eaLnBrk="1" latinLnBrk="0" hangingPunct="1">
+        <a:defRPr sz="851" kern="1200">
           <a:solidFill>
             <a:schemeClr val="tx1"/>
           </a:solidFill>
@@ -4134,9 +4961,9 @@
           </p:nvPr>
         </p:nvSpPr>
         <p:spPr>
-          <a:xfrm rot="20941804">
-            <a:off x="-63033" y="250493"/>
-            <a:ext cx="7016776" cy="1214661"/>
+          <a:xfrm rot="20597848">
+            <a:off x="-892158" y="-454"/>
+            <a:ext cx="8604608" cy="1793156"/>
           </a:xfrm>
         </p:spPr>
         <p:txBody>
@@ -4146,7 +4973,7 @@
           <a:lstStyle/>
           <a:p>
             <a:r>
-              <a:rPr lang="es-MX" sz="5400" b="1" dirty="0">
+              <a:rPr lang="es-MX" sz="5600" b="1" dirty="0">
                 <a:solidFill>
                   <a:srgbClr val="00CC99"/>
                 </a:solidFill>
@@ -4172,16 +4999,16 @@
           <p:nvPr/>
         </p:nvSpPr>
         <p:spPr>
-          <a:xfrm rot="20881045">
-            <a:off x="900446" y="1264465"/>
-            <a:ext cx="6114979" cy="543344"/>
+          <a:xfrm rot="20614685">
+            <a:off x="1226956" y="1615672"/>
+            <a:ext cx="6114979" cy="543343"/>
           </a:xfrm>
           <a:prstGeom prst="rect">
             <a:avLst/>
           </a:prstGeom>
         </p:spPr>
         <p:txBody>
-          <a:bodyPr vert="horz" lIns="91438" tIns="45719" rIns="91438" bIns="45719" rtlCol="0" anchor="b">
+          <a:bodyPr vert="horz" lIns="91437" tIns="45719" rIns="91437" bIns="45719" rtlCol="0" anchor="b">
             <a:noAutofit/>
           </a:bodyPr>
           <a:lstStyle>
@@ -4280,15 +5107,15 @@
         </p:nvSpPr>
         <p:spPr>
           <a:xfrm>
-            <a:off x="7267420" y="311039"/>
-            <a:ext cx="4595038" cy="1693595"/>
+            <a:off x="7443560" y="655220"/>
+            <a:ext cx="4595037" cy="1693595"/>
           </a:xfrm>
           <a:prstGeom prst="rect">
             <a:avLst/>
           </a:prstGeom>
         </p:spPr>
         <p:txBody>
-          <a:bodyPr vert="horz" lIns="91438" tIns="45719" rIns="91438" bIns="45719" rtlCol="0" anchor="b">
+          <a:bodyPr vert="horz" lIns="91437" tIns="45719" rIns="91437" bIns="45719" rtlCol="0" anchor="b">
             <a:noAutofit/>
           </a:bodyPr>
           <a:lstStyle>

</xml_diff>